<commit_message>
pushing like I give birth
</commit_message>
<xml_diff>
--- a/Presi aux.pptx
+++ b/Presi aux.pptx
@@ -6,14 +6,6 @@
   </p:sldMasterIdLst>
   <p:sldIdLst>
     <p:sldId id="256" r:id="rId2"/>
-    <p:sldId id="257" r:id="rId3"/>
-    <p:sldId id="258" r:id="rId4"/>
-    <p:sldId id="259" r:id="rId5"/>
-    <p:sldId id="260" r:id="rId6"/>
-    <p:sldId id="261" r:id="rId7"/>
-    <p:sldId id="262" r:id="rId8"/>
-    <p:sldId id="263" r:id="rId9"/>
-    <p:sldId id="264" r:id="rId10"/>
   </p:sldIdLst>
   <p:sldSz cx="12192000" cy="6858000"/>
   <p:notesSz cx="6858000" cy="9144000"/>
@@ -3355,823 +3347,12 @@
           <a:chExt cx="0" cy="0"/>
         </a:xfrm>
       </p:grpSpPr>
-      <p:pic>
-        <p:nvPicPr>
-          <p:cNvPr id="2" name="Grafik 1">
-            <a:extLst>
-              <a:ext uri="{FF2B5EF4-FFF2-40B4-BE49-F238E27FC236}">
-                <a16:creationId xmlns:a16="http://schemas.microsoft.com/office/drawing/2014/main" id="{2A0D355F-D89B-42D5-9E97-4C3EA60829A2}"/>
-              </a:ext>
-            </a:extLst>
-          </p:cNvPr>
-          <p:cNvPicPr>
-            <a:picLocks noChangeAspect="1"/>
-          </p:cNvPicPr>
-          <p:nvPr/>
-        </p:nvPicPr>
-        <p:blipFill>
-          <a:blip r:embed="rId2"/>
-          <a:stretch>
-            <a:fillRect/>
-          </a:stretch>
-        </p:blipFill>
-        <p:spPr>
-          <a:xfrm>
-            <a:off x="2743200" y="208797"/>
-            <a:ext cx="6553200" cy="6294034"/>
-          </a:xfrm>
-          <a:prstGeom prst="rect">
-            <a:avLst/>
-          </a:prstGeom>
-        </p:spPr>
-      </p:pic>
-    </p:spTree>
-    <p:extLst>
-      <p:ext uri="{BB962C8B-B14F-4D97-AF65-F5344CB8AC3E}">
-        <p14:creationId xmlns:p14="http://schemas.microsoft.com/office/powerpoint/2010/main" val="4278355565"/>
-      </p:ext>
-    </p:extLst>
-  </p:cSld>
-  <p:clrMapOvr>
-    <a:masterClrMapping/>
-  </p:clrMapOvr>
-</p:sld>
-</file>
-
-<file path=ppt/slides/slide2.xml><?xml version="1.0" encoding="utf-8"?>
-<p:sld xmlns:a="http://schemas.openxmlformats.org/drawingml/2006/main" xmlns:r="http://schemas.openxmlformats.org/officeDocument/2006/relationships" xmlns:p="http://schemas.openxmlformats.org/presentationml/2006/main">
-  <p:cSld>
-    <p:spTree>
-      <p:nvGrpSpPr>
-        <p:cNvPr id="1" name=""/>
-        <p:cNvGrpSpPr/>
-        <p:nvPr/>
-      </p:nvGrpSpPr>
-      <p:grpSpPr>
-        <a:xfrm>
-          <a:off x="0" y="0"/>
-          <a:ext cx="0" cy="0"/>
-          <a:chOff x="0" y="0"/>
-          <a:chExt cx="0" cy="0"/>
-        </a:xfrm>
-      </p:grpSpPr>
-      <p:pic>
-        <p:nvPicPr>
-          <p:cNvPr id="6" name="Inhaltsplatzhalter 5" descr="Bildschirmausschnitt">
-            <a:extLst>
-              <a:ext uri="{FF2B5EF4-FFF2-40B4-BE49-F238E27FC236}">
-                <a16:creationId xmlns:a16="http://schemas.microsoft.com/office/drawing/2014/main" id="{8195210E-DD69-4818-A7AB-16318D3B787E}"/>
-              </a:ext>
-            </a:extLst>
-          </p:cNvPr>
-          <p:cNvPicPr>
-            <a:picLocks noGrp="1" noChangeAspect="1"/>
-          </p:cNvPicPr>
-          <p:nvPr>
-            <p:ph idx="1"/>
-          </p:nvPr>
-        </p:nvPicPr>
-        <p:blipFill>
-          <a:blip r:embed="rId2">
-            <a:extLst>
-              <a:ext uri="{28A0092B-C50C-407E-A947-70E740481C1C}">
-                <a14:useLocalDpi xmlns:a14="http://schemas.microsoft.com/office/drawing/2010/main" val="0"/>
-              </a:ext>
-            </a:extLst>
-          </a:blip>
-          <a:stretch>
-            <a:fillRect/>
-          </a:stretch>
-        </p:blipFill>
-        <p:spPr>
-          <a:xfrm>
-            <a:off x="1278711" y="312409"/>
-            <a:ext cx="9003618" cy="6251005"/>
-          </a:xfrm>
-        </p:spPr>
-      </p:pic>
-      <p:pic>
-        <p:nvPicPr>
-          <p:cNvPr id="3" name="Grafik 2" descr="Bildschirmausschnitt">
-            <a:extLst>
-              <a:ext uri="{FF2B5EF4-FFF2-40B4-BE49-F238E27FC236}">
-                <a16:creationId xmlns:a16="http://schemas.microsoft.com/office/drawing/2014/main" id="{CF6C7050-7E8E-4FD3-A321-6C0617BBE4A6}"/>
-              </a:ext>
-            </a:extLst>
-          </p:cNvPr>
-          <p:cNvPicPr>
-            <a:picLocks noChangeAspect="1"/>
-          </p:cNvPicPr>
-          <p:nvPr/>
-        </p:nvPicPr>
-        <p:blipFill>
-          <a:blip r:embed="rId3">
-            <a:extLst>
-              <a:ext uri="{28A0092B-C50C-407E-A947-70E740481C1C}">
-                <a14:useLocalDpi xmlns:a14="http://schemas.microsoft.com/office/drawing/2010/main" val="0"/>
-              </a:ext>
-            </a:extLst>
-          </a:blip>
-          <a:stretch>
-            <a:fillRect/>
-          </a:stretch>
-        </p:blipFill>
-        <p:spPr>
-          <a:xfrm>
-            <a:off x="3987691" y="1939848"/>
-            <a:ext cx="4216617" cy="2978303"/>
-          </a:xfrm>
-          <a:prstGeom prst="rect">
-            <a:avLst/>
-          </a:prstGeom>
-        </p:spPr>
-      </p:pic>
-      <p:pic>
-        <p:nvPicPr>
-          <p:cNvPr id="5" name="Grafik 4" descr="Bildschirmausschnitt">
-            <a:extLst>
-              <a:ext uri="{FF2B5EF4-FFF2-40B4-BE49-F238E27FC236}">
-                <a16:creationId xmlns:a16="http://schemas.microsoft.com/office/drawing/2014/main" id="{311E15A1-525C-4346-9FB4-7F89F59CD660}"/>
-              </a:ext>
-            </a:extLst>
-          </p:cNvPr>
-          <p:cNvPicPr>
-            <a:picLocks noChangeAspect="1"/>
-          </p:cNvPicPr>
-          <p:nvPr/>
-        </p:nvPicPr>
-        <p:blipFill>
-          <a:blip r:embed="rId4">
-            <a:extLst>
-              <a:ext uri="{28A0092B-C50C-407E-A947-70E740481C1C}">
-                <a14:useLocalDpi xmlns:a14="http://schemas.microsoft.com/office/drawing/2010/main" val="0"/>
-              </a:ext>
-            </a:extLst>
-          </a:blip>
-          <a:stretch>
-            <a:fillRect/>
-          </a:stretch>
-        </p:blipFill>
-        <p:spPr>
-          <a:xfrm>
-            <a:off x="5143391" y="2775181"/>
-            <a:ext cx="4242018" cy="2965602"/>
-          </a:xfrm>
-          <a:prstGeom prst="rect">
-            <a:avLst/>
-          </a:prstGeom>
-        </p:spPr>
-      </p:pic>
-      <p:pic>
-        <p:nvPicPr>
-          <p:cNvPr id="8" name="Grafik 7" descr="Bildschirmausschnitt">
-            <a:extLst>
-              <a:ext uri="{FF2B5EF4-FFF2-40B4-BE49-F238E27FC236}">
-                <a16:creationId xmlns:a16="http://schemas.microsoft.com/office/drawing/2014/main" id="{761C1680-CC03-4FD4-870C-04F25F2E59D5}"/>
-              </a:ext>
-            </a:extLst>
-          </p:cNvPr>
-          <p:cNvPicPr>
-            <a:picLocks noChangeAspect="1"/>
-          </p:cNvPicPr>
-          <p:nvPr/>
-        </p:nvPicPr>
-        <p:blipFill>
-          <a:blip r:embed="rId5">
-            <a:extLst>
-              <a:ext uri="{28A0092B-C50C-407E-A947-70E740481C1C}">
-                <a14:useLocalDpi xmlns:a14="http://schemas.microsoft.com/office/drawing/2010/main" val="0"/>
-              </a:ext>
-            </a:extLst>
-          </a:blip>
-          <a:stretch>
-            <a:fillRect/>
-          </a:stretch>
-        </p:blipFill>
-        <p:spPr>
-          <a:xfrm>
-            <a:off x="6286390" y="3437911"/>
-            <a:ext cx="4254719" cy="2971953"/>
-          </a:xfrm>
-          <a:prstGeom prst="rect">
-            <a:avLst/>
-          </a:prstGeom>
-        </p:spPr>
-      </p:pic>
-    </p:spTree>
-    <p:extLst>
-      <p:ext uri="{BB962C8B-B14F-4D97-AF65-F5344CB8AC3E}">
-        <p14:creationId xmlns:p14="http://schemas.microsoft.com/office/powerpoint/2010/main" val="1766006259"/>
-      </p:ext>
-    </p:extLst>
-  </p:cSld>
-  <p:clrMapOvr>
-    <a:masterClrMapping/>
-  </p:clrMapOvr>
-</p:sld>
-</file>
-
-<file path=ppt/slides/slide3.xml><?xml version="1.0" encoding="utf-8"?>
-<p:sld xmlns:a="http://schemas.openxmlformats.org/drawingml/2006/main" xmlns:r="http://schemas.openxmlformats.org/officeDocument/2006/relationships" xmlns:p="http://schemas.openxmlformats.org/presentationml/2006/main">
-  <p:cSld>
-    <p:spTree>
-      <p:nvGrpSpPr>
-        <p:cNvPr id="1" name=""/>
-        <p:cNvGrpSpPr/>
-        <p:nvPr/>
-      </p:nvGrpSpPr>
-      <p:grpSpPr>
-        <a:xfrm>
-          <a:off x="0" y="0"/>
-          <a:ext cx="0" cy="0"/>
-          <a:chOff x="0" y="0"/>
-          <a:chExt cx="0" cy="0"/>
-        </a:xfrm>
-      </p:grpSpPr>
-      <p:pic>
-        <p:nvPicPr>
-          <p:cNvPr id="5" name="Grafik 4" descr="Bildschirmausschnitt">
-            <a:extLst>
-              <a:ext uri="{FF2B5EF4-FFF2-40B4-BE49-F238E27FC236}">
-                <a16:creationId xmlns:a16="http://schemas.microsoft.com/office/drawing/2014/main" id="{B90F44E1-F797-4D54-9B7A-154883C42F29}"/>
-              </a:ext>
-            </a:extLst>
-          </p:cNvPr>
-          <p:cNvPicPr>
-            <a:picLocks noChangeAspect="1"/>
-          </p:cNvPicPr>
-          <p:nvPr/>
-        </p:nvPicPr>
-        <p:blipFill>
-          <a:blip r:embed="rId2">
-            <a:extLst>
-              <a:ext uri="{28A0092B-C50C-407E-A947-70E740481C1C}">
-                <a14:useLocalDpi xmlns:a14="http://schemas.microsoft.com/office/drawing/2010/main" val="0"/>
-              </a:ext>
-            </a:extLst>
-          </a:blip>
-          <a:stretch>
-            <a:fillRect/>
-          </a:stretch>
-        </p:blipFill>
-        <p:spPr>
-          <a:xfrm>
-            <a:off x="233822" y="1570915"/>
-            <a:ext cx="5624635" cy="4067181"/>
-          </a:xfrm>
-          <a:prstGeom prst="rect">
-            <a:avLst/>
-          </a:prstGeom>
-        </p:spPr>
-      </p:pic>
-      <p:pic>
-        <p:nvPicPr>
-          <p:cNvPr id="7" name="Grafik 6" descr="Bildschirmausschnitt">
-            <a:extLst>
-              <a:ext uri="{FF2B5EF4-FFF2-40B4-BE49-F238E27FC236}">
-                <a16:creationId xmlns:a16="http://schemas.microsoft.com/office/drawing/2014/main" id="{22707DBF-4BA9-4668-8386-202E58E3460C}"/>
-              </a:ext>
-            </a:extLst>
-          </p:cNvPr>
-          <p:cNvPicPr>
-            <a:picLocks noChangeAspect="1"/>
-          </p:cNvPicPr>
-          <p:nvPr/>
-        </p:nvPicPr>
-        <p:blipFill>
-          <a:blip r:embed="rId3">
-            <a:extLst>
-              <a:ext uri="{28A0092B-C50C-407E-A947-70E740481C1C}">
-                <a14:useLocalDpi xmlns:a14="http://schemas.microsoft.com/office/drawing/2010/main" val="0"/>
-              </a:ext>
-            </a:extLst>
-          </a:blip>
-          <a:stretch>
-            <a:fillRect/>
-          </a:stretch>
-        </p:blipFill>
-        <p:spPr>
-          <a:xfrm>
-            <a:off x="5942224" y="1570915"/>
-            <a:ext cx="5823056" cy="4067181"/>
-          </a:xfrm>
-          <a:prstGeom prst="rect">
-            <a:avLst/>
-          </a:prstGeom>
-        </p:spPr>
-      </p:pic>
-    </p:spTree>
-    <p:extLst>
-      <p:ext uri="{BB962C8B-B14F-4D97-AF65-F5344CB8AC3E}">
-        <p14:creationId xmlns:p14="http://schemas.microsoft.com/office/powerpoint/2010/main" val="952972786"/>
-      </p:ext>
-    </p:extLst>
-  </p:cSld>
-  <p:clrMapOvr>
-    <a:masterClrMapping/>
-  </p:clrMapOvr>
-</p:sld>
-</file>
-
-<file path=ppt/slides/slide4.xml><?xml version="1.0" encoding="utf-8"?>
-<p:sld xmlns:a="http://schemas.openxmlformats.org/drawingml/2006/main" xmlns:r="http://schemas.openxmlformats.org/officeDocument/2006/relationships" xmlns:p="http://schemas.openxmlformats.org/presentationml/2006/main">
-  <p:cSld>
-    <p:spTree>
-      <p:nvGrpSpPr>
-        <p:cNvPr id="1" name=""/>
-        <p:cNvGrpSpPr/>
-        <p:nvPr/>
-      </p:nvGrpSpPr>
-      <p:grpSpPr>
-        <a:xfrm>
-          <a:off x="0" y="0"/>
-          <a:ext cx="0" cy="0"/>
-          <a:chOff x="0" y="0"/>
-          <a:chExt cx="0" cy="0"/>
-        </a:xfrm>
-      </p:grpSpPr>
-      <p:pic>
-        <p:nvPicPr>
-          <p:cNvPr id="9" name="Inhaltsplatzhalter 8" descr="Bildschirmausschnitt">
-            <a:extLst>
-              <a:ext uri="{FF2B5EF4-FFF2-40B4-BE49-F238E27FC236}">
-                <a16:creationId xmlns:a16="http://schemas.microsoft.com/office/drawing/2014/main" id="{511D81F8-5740-4CC2-96AF-C767B7FDC6CD}"/>
-              </a:ext>
-            </a:extLst>
-          </p:cNvPr>
-          <p:cNvPicPr>
-            <a:picLocks noGrp="1" noChangeAspect="1"/>
-          </p:cNvPicPr>
-          <p:nvPr>
-            <p:ph idx="1"/>
-          </p:nvPr>
-        </p:nvPicPr>
-        <p:blipFill>
-          <a:blip r:embed="rId2">
-            <a:extLst>
-              <a:ext uri="{28A0092B-C50C-407E-A947-70E740481C1C}">
-                <a14:useLocalDpi xmlns:a14="http://schemas.microsoft.com/office/drawing/2010/main" val="0"/>
-              </a:ext>
-            </a:extLst>
-          </a:blip>
-          <a:stretch>
-            <a:fillRect/>
-          </a:stretch>
-        </p:blipFill>
-        <p:spPr>
-          <a:xfrm>
-            <a:off x="1817819" y="961534"/>
-            <a:ext cx="7590131" cy="5392988"/>
-          </a:xfrm>
-        </p:spPr>
-      </p:pic>
-    </p:spTree>
-    <p:extLst>
-      <p:ext uri="{BB962C8B-B14F-4D97-AF65-F5344CB8AC3E}">
-        <p14:creationId xmlns:p14="http://schemas.microsoft.com/office/powerpoint/2010/main" val="3307373972"/>
-      </p:ext>
-    </p:extLst>
-  </p:cSld>
-  <p:clrMapOvr>
-    <a:masterClrMapping/>
-  </p:clrMapOvr>
-</p:sld>
-</file>
-
-<file path=ppt/slides/slide5.xml><?xml version="1.0" encoding="utf-8"?>
-<p:sld xmlns:a="http://schemas.openxmlformats.org/drawingml/2006/main" xmlns:r="http://schemas.openxmlformats.org/officeDocument/2006/relationships" xmlns:p="http://schemas.openxmlformats.org/presentationml/2006/main">
-  <p:cSld>
-    <p:spTree>
-      <p:nvGrpSpPr>
-        <p:cNvPr id="1" name=""/>
-        <p:cNvGrpSpPr/>
-        <p:nvPr/>
-      </p:nvGrpSpPr>
-      <p:grpSpPr>
-        <a:xfrm>
-          <a:off x="0" y="0"/>
-          <a:ext cx="0" cy="0"/>
-          <a:chOff x="0" y="0"/>
-          <a:chExt cx="0" cy="0"/>
-        </a:xfrm>
-      </p:grpSpPr>
-      <p:sp>
-        <p:nvSpPr>
-          <p:cNvPr id="2" name="Titel 1">
-            <a:extLst>
-              <a:ext uri="{FF2B5EF4-FFF2-40B4-BE49-F238E27FC236}">
-                <a16:creationId xmlns:a16="http://schemas.microsoft.com/office/drawing/2014/main" id="{52EAE3DC-ABE7-4818-B17B-362296504349}"/>
-              </a:ext>
-            </a:extLst>
-          </p:cNvPr>
-          <p:cNvSpPr>
-            <a:spLocks noGrp="1"/>
-          </p:cNvSpPr>
-          <p:nvPr>
-            <p:ph type="title"/>
-          </p:nvPr>
-        </p:nvSpPr>
-        <p:spPr/>
-        <p:txBody>
-          <a:bodyPr/>
-          <a:lstStyle/>
-          <a:p>
-            <a:r>
-              <a:rPr lang="en-US" dirty="0"/>
-              <a:t>Now both networks combined:</a:t>
-            </a:r>
-          </a:p>
-        </p:txBody>
-      </p:sp>
-      <p:pic>
-        <p:nvPicPr>
-          <p:cNvPr id="5" name="Inhaltsplatzhalter 4" descr="Bildschirmausschnitt">
-            <a:extLst>
-              <a:ext uri="{FF2B5EF4-FFF2-40B4-BE49-F238E27FC236}">
-                <a16:creationId xmlns:a16="http://schemas.microsoft.com/office/drawing/2014/main" id="{DE7BE09D-BD07-43AF-BB56-4521234F8558}"/>
-              </a:ext>
-            </a:extLst>
-          </p:cNvPr>
-          <p:cNvPicPr>
-            <a:picLocks noGrp="1" noChangeAspect="1"/>
-          </p:cNvPicPr>
-          <p:nvPr>
-            <p:ph idx="1"/>
-          </p:nvPr>
-        </p:nvPicPr>
-        <p:blipFill>
-          <a:blip r:embed="rId2">
-            <a:extLst>
-              <a:ext uri="{28A0092B-C50C-407E-A947-70E740481C1C}">
-                <a14:useLocalDpi xmlns:a14="http://schemas.microsoft.com/office/drawing/2010/main" val="0"/>
-              </a:ext>
-            </a:extLst>
-          </a:blip>
-          <a:stretch>
-            <a:fillRect/>
-          </a:stretch>
-        </p:blipFill>
-        <p:spPr>
-          <a:xfrm>
-            <a:off x="696393" y="1690688"/>
-            <a:ext cx="5544490" cy="4021955"/>
-          </a:xfrm>
-        </p:spPr>
-      </p:pic>
-      <p:pic>
-        <p:nvPicPr>
-          <p:cNvPr id="8" name="Grafik 7" descr="Bildschirmausschnitt">
-            <a:extLst>
-              <a:ext uri="{FF2B5EF4-FFF2-40B4-BE49-F238E27FC236}">
-                <a16:creationId xmlns:a16="http://schemas.microsoft.com/office/drawing/2014/main" id="{95E2FFCD-4D82-46C6-A729-BB2405707598}"/>
-              </a:ext>
-            </a:extLst>
-          </p:cNvPr>
-          <p:cNvPicPr>
-            <a:picLocks noChangeAspect="1"/>
-          </p:cNvPicPr>
-          <p:nvPr/>
-        </p:nvPicPr>
-        <p:blipFill>
-          <a:blip r:embed="rId3">
-            <a:extLst>
-              <a:ext uri="{28A0092B-C50C-407E-A947-70E740481C1C}">
-                <a14:useLocalDpi xmlns:a14="http://schemas.microsoft.com/office/drawing/2010/main" val="0"/>
-              </a:ext>
-            </a:extLst>
-          </a:blip>
-          <a:stretch>
-            <a:fillRect/>
-          </a:stretch>
-        </p:blipFill>
-        <p:spPr>
-          <a:xfrm>
-            <a:off x="6382690" y="1690688"/>
-            <a:ext cx="5641298" cy="4021955"/>
-          </a:xfrm>
-          <a:prstGeom prst="rect">
-            <a:avLst/>
-          </a:prstGeom>
-        </p:spPr>
-      </p:pic>
-    </p:spTree>
-    <p:extLst>
-      <p:ext uri="{BB962C8B-B14F-4D97-AF65-F5344CB8AC3E}">
-        <p14:creationId xmlns:p14="http://schemas.microsoft.com/office/powerpoint/2010/main" val="2296994606"/>
-      </p:ext>
-    </p:extLst>
-  </p:cSld>
-  <p:clrMapOvr>
-    <a:masterClrMapping/>
-  </p:clrMapOvr>
-</p:sld>
-</file>
-
-<file path=ppt/slides/slide6.xml><?xml version="1.0" encoding="utf-8"?>
-<p:sld xmlns:a="http://schemas.openxmlformats.org/drawingml/2006/main" xmlns:r="http://schemas.openxmlformats.org/officeDocument/2006/relationships" xmlns:p="http://schemas.openxmlformats.org/presentationml/2006/main">
-  <p:cSld>
-    <p:spTree>
-      <p:nvGrpSpPr>
-        <p:cNvPr id="1" name=""/>
-        <p:cNvGrpSpPr/>
-        <p:nvPr/>
-      </p:nvGrpSpPr>
-      <p:grpSpPr>
-        <a:xfrm>
-          <a:off x="0" y="0"/>
-          <a:ext cx="0" cy="0"/>
-          <a:chOff x="0" y="0"/>
-          <a:chExt cx="0" cy="0"/>
-        </a:xfrm>
-      </p:grpSpPr>
-      <p:sp>
-        <p:nvSpPr>
-          <p:cNvPr id="2" name="Titel 1">
-            <a:extLst>
-              <a:ext uri="{FF2B5EF4-FFF2-40B4-BE49-F238E27FC236}">
-                <a16:creationId xmlns:a16="http://schemas.microsoft.com/office/drawing/2014/main" id="{2C737A7A-B7E3-4D98-B36B-7043E8310778}"/>
-              </a:ext>
-            </a:extLst>
-          </p:cNvPr>
-          <p:cNvSpPr>
-            <a:spLocks noGrp="1"/>
-          </p:cNvSpPr>
-          <p:nvPr>
-            <p:ph type="title"/>
-          </p:nvPr>
-        </p:nvSpPr>
-        <p:spPr/>
-        <p:txBody>
-          <a:bodyPr/>
-          <a:lstStyle/>
-          <a:p>
-            <a:endParaRPr lang="en-US"/>
-          </a:p>
-        </p:txBody>
-      </p:sp>
-      <p:pic>
-        <p:nvPicPr>
-          <p:cNvPr id="4" name="Grafik 3" descr="Bildschirmausschnitt">
-            <a:extLst>
-              <a:ext uri="{FF2B5EF4-FFF2-40B4-BE49-F238E27FC236}">
-                <a16:creationId xmlns:a16="http://schemas.microsoft.com/office/drawing/2014/main" id="{9E73E1E9-7591-481E-AB9F-F8312DF3EDE4}"/>
-              </a:ext>
-            </a:extLst>
-          </p:cNvPr>
-          <p:cNvPicPr>
-            <a:picLocks noChangeAspect="1"/>
-          </p:cNvPicPr>
-          <p:nvPr/>
-        </p:nvPicPr>
-        <p:blipFill>
-          <a:blip r:embed="rId2">
-            <a:extLst>
-              <a:ext uri="{28A0092B-C50C-407E-A947-70E740481C1C}">
-                <a14:useLocalDpi xmlns:a14="http://schemas.microsoft.com/office/drawing/2010/main" val="0"/>
-              </a:ext>
-            </a:extLst>
-          </a:blip>
-          <a:stretch>
-            <a:fillRect/>
-          </a:stretch>
-        </p:blipFill>
-        <p:spPr>
-          <a:xfrm>
-            <a:off x="838199" y="1922848"/>
-            <a:ext cx="6389329" cy="4591074"/>
-          </a:xfrm>
-          <a:prstGeom prst="rect">
-            <a:avLst/>
-          </a:prstGeom>
-        </p:spPr>
-      </p:pic>
-    </p:spTree>
-    <p:extLst>
-      <p:ext uri="{BB962C8B-B14F-4D97-AF65-F5344CB8AC3E}">
-        <p14:creationId xmlns:p14="http://schemas.microsoft.com/office/powerpoint/2010/main" val="2573050941"/>
-      </p:ext>
-    </p:extLst>
-  </p:cSld>
-  <p:clrMapOvr>
-    <a:masterClrMapping/>
-  </p:clrMapOvr>
-</p:sld>
-</file>
-
-<file path=ppt/slides/slide7.xml><?xml version="1.0" encoding="utf-8"?>
-<p:sld xmlns:a="http://schemas.openxmlformats.org/drawingml/2006/main" xmlns:r="http://schemas.openxmlformats.org/officeDocument/2006/relationships" xmlns:p="http://schemas.openxmlformats.org/presentationml/2006/main">
-  <p:cSld>
-    <p:spTree>
-      <p:nvGrpSpPr>
-        <p:cNvPr id="1" name=""/>
-        <p:cNvGrpSpPr/>
-        <p:nvPr/>
-      </p:nvGrpSpPr>
-      <p:grpSpPr>
-        <a:xfrm>
-          <a:off x="0" y="0"/>
-          <a:ext cx="0" cy="0"/>
-          <a:chOff x="0" y="0"/>
-          <a:chExt cx="0" cy="0"/>
-        </a:xfrm>
-      </p:grpSpPr>
-      <p:pic>
-        <p:nvPicPr>
-          <p:cNvPr id="5" name="Inhaltsplatzhalter 4">
-            <a:extLst>
-              <a:ext uri="{FF2B5EF4-FFF2-40B4-BE49-F238E27FC236}">
-                <a16:creationId xmlns:a16="http://schemas.microsoft.com/office/drawing/2014/main" id="{EFF47363-BE09-40FA-997E-0EA9BA95DD6B}"/>
-              </a:ext>
-            </a:extLst>
-          </p:cNvPr>
-          <p:cNvPicPr>
-            <a:picLocks noGrp="1" noChangeAspect="1"/>
-          </p:cNvPicPr>
-          <p:nvPr>
-            <p:ph idx="1"/>
-          </p:nvPr>
-        </p:nvPicPr>
-        <p:blipFill>
-          <a:blip r:embed="rId2">
-            <a:extLst>
-              <a:ext uri="{28A0092B-C50C-407E-A947-70E740481C1C}">
-                <a14:useLocalDpi xmlns:a14="http://schemas.microsoft.com/office/drawing/2010/main" val="0"/>
-              </a:ext>
-            </a:extLst>
-          </a:blip>
-          <a:stretch>
-            <a:fillRect/>
-          </a:stretch>
-        </p:blipFill>
-        <p:spPr>
-          <a:xfrm>
-            <a:off x="352193" y="649043"/>
-            <a:ext cx="6468573" cy="5355014"/>
-          </a:xfrm>
-        </p:spPr>
-      </p:pic>
-      <p:pic>
-        <p:nvPicPr>
-          <p:cNvPr id="3" name="Grafik 2" descr="Bildschirmausschnitt">
-            <a:extLst>
-              <a:ext uri="{FF2B5EF4-FFF2-40B4-BE49-F238E27FC236}">
-                <a16:creationId xmlns:a16="http://schemas.microsoft.com/office/drawing/2014/main" id="{6E93F949-1892-4D6A-89F6-B1D9414EBF8B}"/>
-              </a:ext>
-            </a:extLst>
-          </p:cNvPr>
-          <p:cNvPicPr>
-            <a:picLocks noChangeAspect="1"/>
-          </p:cNvPicPr>
-          <p:nvPr/>
-        </p:nvPicPr>
-        <p:blipFill>
-          <a:blip r:embed="rId3">
-            <a:extLst>
-              <a:ext uri="{28A0092B-C50C-407E-A947-70E740481C1C}">
-                <a14:useLocalDpi xmlns:a14="http://schemas.microsoft.com/office/drawing/2010/main" val="0"/>
-              </a:ext>
-            </a:extLst>
-          </a:blip>
-          <a:stretch>
-            <a:fillRect/>
-          </a:stretch>
-        </p:blipFill>
-        <p:spPr>
-          <a:xfrm>
-            <a:off x="4714873" y="2499360"/>
-            <a:ext cx="7304077" cy="3159257"/>
-          </a:xfrm>
-          <a:prstGeom prst="rect">
-            <a:avLst/>
-          </a:prstGeom>
-        </p:spPr>
-      </p:pic>
-    </p:spTree>
-    <p:extLst>
-      <p:ext uri="{BB962C8B-B14F-4D97-AF65-F5344CB8AC3E}">
-        <p14:creationId xmlns:p14="http://schemas.microsoft.com/office/powerpoint/2010/main" val="586774717"/>
-      </p:ext>
-    </p:extLst>
-  </p:cSld>
-  <p:clrMapOvr>
-    <a:masterClrMapping/>
-  </p:clrMapOvr>
-</p:sld>
-</file>
-
-<file path=ppt/slides/slide8.xml><?xml version="1.0" encoding="utf-8"?>
-<p:sld xmlns:a="http://schemas.openxmlformats.org/drawingml/2006/main" xmlns:r="http://schemas.openxmlformats.org/officeDocument/2006/relationships" xmlns:p="http://schemas.openxmlformats.org/presentationml/2006/main">
-  <p:cSld>
-    <p:spTree>
-      <p:nvGrpSpPr>
-        <p:cNvPr id="1" name=""/>
-        <p:cNvGrpSpPr/>
-        <p:nvPr/>
-      </p:nvGrpSpPr>
-      <p:grpSpPr>
-        <a:xfrm>
-          <a:off x="0" y="0"/>
-          <a:ext cx="0" cy="0"/>
-          <a:chOff x="0" y="0"/>
-          <a:chExt cx="0" cy="0"/>
-        </a:xfrm>
-      </p:grpSpPr>
-      <p:sp>
-        <p:nvSpPr>
-          <p:cNvPr id="2" name="Titel 1">
-            <a:extLst>
-              <a:ext uri="{FF2B5EF4-FFF2-40B4-BE49-F238E27FC236}">
-                <a16:creationId xmlns:a16="http://schemas.microsoft.com/office/drawing/2014/main" id="{34DBE545-26EF-4E55-A520-116B584B997C}"/>
-              </a:ext>
-            </a:extLst>
-          </p:cNvPr>
-          <p:cNvSpPr>
-            <a:spLocks noGrp="1"/>
-          </p:cNvSpPr>
-          <p:nvPr>
-            <p:ph type="title"/>
-          </p:nvPr>
-        </p:nvSpPr>
-        <p:spPr/>
-        <p:txBody>
-          <a:bodyPr/>
-          <a:lstStyle/>
-          <a:p>
-            <a:endParaRPr lang="en-US"/>
-          </a:p>
-        </p:txBody>
-      </p:sp>
-      <p:pic>
-        <p:nvPicPr>
-          <p:cNvPr id="5" name="Inhaltsplatzhalter 4" descr="Bildschirmausschnitt">
-            <a:extLst>
-              <a:ext uri="{FF2B5EF4-FFF2-40B4-BE49-F238E27FC236}">
-                <a16:creationId xmlns:a16="http://schemas.microsoft.com/office/drawing/2014/main" id="{F04707F8-2E45-4533-8EC5-FAB693DCA613}"/>
-              </a:ext>
-            </a:extLst>
-          </p:cNvPr>
-          <p:cNvPicPr>
-            <a:picLocks noGrp="1" noChangeAspect="1"/>
-          </p:cNvPicPr>
-          <p:nvPr>
-            <p:ph idx="1"/>
-          </p:nvPr>
-        </p:nvPicPr>
-        <p:blipFill>
-          <a:blip r:embed="rId2">
-            <a:extLst>
-              <a:ext uri="{28A0092B-C50C-407E-A947-70E740481C1C}">
-                <a14:useLocalDpi xmlns:a14="http://schemas.microsoft.com/office/drawing/2010/main" val="0"/>
-              </a:ext>
-            </a:extLst>
-          </a:blip>
-          <a:stretch>
-            <a:fillRect/>
-          </a:stretch>
-        </p:blipFill>
-        <p:spPr>
-          <a:xfrm>
-            <a:off x="4026569" y="348163"/>
-            <a:ext cx="3301908" cy="5828800"/>
-          </a:xfrm>
-        </p:spPr>
-      </p:pic>
-    </p:spTree>
-    <p:extLst>
-      <p:ext uri="{BB962C8B-B14F-4D97-AF65-F5344CB8AC3E}">
-        <p14:creationId xmlns:p14="http://schemas.microsoft.com/office/powerpoint/2010/main" val="3978934474"/>
-      </p:ext>
-    </p:extLst>
-  </p:cSld>
-  <p:clrMapOvr>
-    <a:masterClrMapping/>
-  </p:clrMapOvr>
-</p:sld>
-</file>
-
-<file path=ppt/slides/slide9.xml><?xml version="1.0" encoding="utf-8"?>
-<p:sld xmlns:a="http://schemas.openxmlformats.org/drawingml/2006/main" xmlns:r="http://schemas.openxmlformats.org/officeDocument/2006/relationships" xmlns:p="http://schemas.openxmlformats.org/presentationml/2006/main">
-  <p:cSld>
-    <p:spTree>
-      <p:nvGrpSpPr>
-        <p:cNvPr id="1" name=""/>
-        <p:cNvGrpSpPr/>
-        <p:nvPr/>
-      </p:nvGrpSpPr>
-      <p:grpSpPr>
-        <a:xfrm>
-          <a:off x="0" y="0"/>
-          <a:ext cx="0" cy="0"/>
-          <a:chOff x="0" y="0"/>
-          <a:chExt cx="0" cy="0"/>
-        </a:xfrm>
-      </p:grpSpPr>
       <p:grpSp>
         <p:nvGrpSpPr>
-          <p:cNvPr id="6" name="Gruppieren 5">
-            <a:extLst>
-              <a:ext uri="{FF2B5EF4-FFF2-40B4-BE49-F238E27FC236}">
-                <a16:creationId xmlns:a16="http://schemas.microsoft.com/office/drawing/2014/main" id="{3CF9B466-66DD-46FF-9007-4B01B098CF66}"/>
+          <p:cNvPr id="16" name="Gruppieren 15">
+            <a:extLst>
+              <a:ext uri="{FF2B5EF4-FFF2-40B4-BE49-F238E27FC236}">
+                <a16:creationId xmlns:a16="http://schemas.microsoft.com/office/drawing/2014/main" id="{E98BC30B-9331-4288-8E2C-D6335544C54B}"/>
               </a:ext>
             </a:extLst>
           </p:cNvPr>
@@ -4180,18 +3361,427 @@
         </p:nvGrpSpPr>
         <p:grpSpPr>
           <a:xfrm>
-            <a:off x="1157161" y="2184850"/>
-            <a:ext cx="4167398" cy="1687190"/>
-            <a:chOff x="1157161" y="2184850"/>
-            <a:chExt cx="4167398" cy="1687190"/>
+            <a:off x="459915" y="2483239"/>
+            <a:ext cx="3826430" cy="2683107"/>
+            <a:chOff x="459915" y="2483239"/>
+            <a:chExt cx="3826430" cy="2683107"/>
           </a:xfrm>
+          <a:solidFill>
+            <a:srgbClr val="E1A2A9"/>
+          </a:solidFill>
         </p:grpSpPr>
         <p:sp>
           <p:nvSpPr>
-            <p:cNvPr id="4" name="Pfeil: nach rechts 3">
+            <p:cNvPr id="44" name="Textfeld 43">
               <a:extLst>
                 <a:ext uri="{FF2B5EF4-FFF2-40B4-BE49-F238E27FC236}">
-                  <a16:creationId xmlns:a16="http://schemas.microsoft.com/office/drawing/2014/main" id="{386CF1BB-0241-415E-BD92-EB8A6EF9AF30}"/>
+                  <a16:creationId xmlns:a16="http://schemas.microsoft.com/office/drawing/2014/main" id="{0E80E08C-29B1-47A2-AAE1-D2261525662B}"/>
+                </a:ext>
+              </a:extLst>
+            </p:cNvPr>
+            <p:cNvSpPr txBox="1"/>
+            <p:nvPr/>
+          </p:nvSpPr>
+          <p:spPr>
+            <a:xfrm>
+              <a:off x="1718650" y="2483239"/>
+              <a:ext cx="1452384" cy="369332"/>
+            </a:xfrm>
+            <a:prstGeom prst="rect">
+              <a:avLst/>
+            </a:prstGeom>
+            <a:noFill/>
+            <a:ln>
+              <a:noFill/>
+            </a:ln>
+          </p:spPr>
+          <p:txBody>
+            <a:bodyPr wrap="square" rtlCol="0">
+              <a:spAutoFit/>
+            </a:bodyPr>
+            <a:lstStyle/>
+            <a:p>
+              <a:r>
+                <a:rPr lang="en-US" dirty="0">
+                  <a:cs typeface="Arial" panose="020B0604020202020204" pitchFamily="34" charset="0"/>
+                </a:rPr>
+                <a:t>Personal Risk</a:t>
+              </a:r>
+            </a:p>
+          </p:txBody>
+        </p:sp>
+        <p:grpSp>
+          <p:nvGrpSpPr>
+            <p:cNvPr id="14" name="Gruppieren 13">
+              <a:extLst>
+                <a:ext uri="{FF2B5EF4-FFF2-40B4-BE49-F238E27FC236}">
+                  <a16:creationId xmlns:a16="http://schemas.microsoft.com/office/drawing/2014/main" id="{B69B603E-D939-4DA4-A6FB-94E60CF8E7B6}"/>
+                </a:ext>
+              </a:extLst>
+            </p:cNvPr>
+            <p:cNvGrpSpPr/>
+            <p:nvPr/>
+          </p:nvGrpSpPr>
+          <p:grpSpPr>
+            <a:xfrm>
+              <a:off x="459915" y="2912911"/>
+              <a:ext cx="3826430" cy="2253435"/>
+              <a:chOff x="459915" y="2912911"/>
+              <a:chExt cx="3826430" cy="2253435"/>
+            </a:xfrm>
+            <a:grpFill/>
+          </p:grpSpPr>
+          <p:sp>
+            <p:nvSpPr>
+              <p:cNvPr id="43" name="Pfeil: nach oben gekrümmt 42">
+                <a:extLst>
+                  <a:ext uri="{FF2B5EF4-FFF2-40B4-BE49-F238E27FC236}">
+                    <a16:creationId xmlns:a16="http://schemas.microsoft.com/office/drawing/2014/main" id="{F812128C-648D-4B48-9C4A-A93EDE8DC801}"/>
+                  </a:ext>
+                </a:extLst>
+              </p:cNvPr>
+              <p:cNvSpPr/>
+              <p:nvPr/>
+            </p:nvSpPr>
+            <p:spPr>
+              <a:xfrm rot="10800000">
+                <a:off x="459915" y="2912911"/>
+                <a:ext cx="3826430" cy="1185353"/>
+              </a:xfrm>
+              <a:prstGeom prst="curvedUpArrow">
+                <a:avLst/>
+              </a:prstGeom>
+              <a:grpFill/>
+              <a:ln>
+                <a:noFill/>
+              </a:ln>
+            </p:spPr>
+            <p:style>
+              <a:lnRef idx="2">
+                <a:schemeClr val="accent1">
+                  <a:shade val="50000"/>
+                </a:schemeClr>
+              </a:lnRef>
+              <a:fillRef idx="1">
+                <a:schemeClr val="accent1"/>
+              </a:fillRef>
+              <a:effectRef idx="0">
+                <a:schemeClr val="accent1"/>
+              </a:effectRef>
+              <a:fontRef idx="minor">
+                <a:schemeClr val="lt1"/>
+              </a:fontRef>
+            </p:style>
+            <p:txBody>
+              <a:bodyPr rtlCol="0" anchor="ctr"/>
+              <a:lstStyle/>
+              <a:p>
+                <a:pPr algn="ctr"/>
+                <a:endParaRPr lang="en-US">
+                  <a:solidFill>
+                    <a:schemeClr val="tx1"/>
+                  </a:solidFill>
+                </a:endParaRPr>
+              </a:p>
+            </p:txBody>
+          </p:sp>
+          <p:grpSp>
+            <p:nvGrpSpPr>
+              <p:cNvPr id="10" name="Gruppieren 9">
+                <a:extLst>
+                  <a:ext uri="{FF2B5EF4-FFF2-40B4-BE49-F238E27FC236}">
+                    <a16:creationId xmlns:a16="http://schemas.microsoft.com/office/drawing/2014/main" id="{D1311D7A-5672-4CEE-B430-79C37B03FB65}"/>
+                  </a:ext>
+                </a:extLst>
+              </p:cNvPr>
+              <p:cNvGrpSpPr/>
+              <p:nvPr/>
+            </p:nvGrpSpPr>
+            <p:grpSpPr>
+              <a:xfrm>
+                <a:off x="1293341" y="3262967"/>
+                <a:ext cx="2636961" cy="1903379"/>
+                <a:chOff x="1293341" y="3262967"/>
+                <a:chExt cx="2636961" cy="1903379"/>
+              </a:xfrm>
+              <a:grpFill/>
+            </p:grpSpPr>
+            <p:pic>
+              <p:nvPicPr>
+                <p:cNvPr id="19" name="Grafik 18" descr="Markierung">
+                  <a:extLst>
+                    <a:ext uri="{FF2B5EF4-FFF2-40B4-BE49-F238E27FC236}">
+                      <a16:creationId xmlns:a16="http://schemas.microsoft.com/office/drawing/2014/main" id="{C49E71B7-5D6D-4D6D-9F64-B8D687C64E22}"/>
+                    </a:ext>
+                  </a:extLst>
+                </p:cNvPr>
+                <p:cNvPicPr>
+                  <a:picLocks noChangeAspect="1"/>
+                </p:cNvPicPr>
+                <p:nvPr/>
+              </p:nvPicPr>
+              <p:blipFill>
+                <a:blip r:embed="rId2">
+                  <a:extLst>
+                    <a:ext uri="{28A0092B-C50C-407E-A947-70E740481C1C}">
+                      <a14:useLocalDpi xmlns:a14="http://schemas.microsoft.com/office/drawing/2010/main" val="0"/>
+                    </a:ext>
+                    <a:ext uri="{96DAC541-7B7A-43D3-8B79-37D633B846F1}">
+                      <asvg:svgBlip xmlns:asvg="http://schemas.microsoft.com/office/drawing/2016/SVG/main" r:embed="rId3"/>
+                    </a:ext>
+                  </a:extLst>
+                </a:blip>
+                <a:stretch>
+                  <a:fillRect/>
+                </a:stretch>
+              </p:blipFill>
+              <p:spPr>
+                <a:xfrm>
+                  <a:off x="1987642" y="3262967"/>
+                  <a:ext cx="914400" cy="914400"/>
+                </a:xfrm>
+                <a:prstGeom prst="rect">
+                  <a:avLst/>
+                </a:prstGeom>
+              </p:spPr>
+            </p:pic>
+            <p:grpSp>
+              <p:nvGrpSpPr>
+                <p:cNvPr id="41" name="Gruppieren 40">
+                  <a:extLst>
+                    <a:ext uri="{FF2B5EF4-FFF2-40B4-BE49-F238E27FC236}">
+                      <a16:creationId xmlns:a16="http://schemas.microsoft.com/office/drawing/2014/main" id="{722CFC97-20CD-4B42-ACE1-DF1E2C29F58B}"/>
+                    </a:ext>
+                  </a:extLst>
+                </p:cNvPr>
+                <p:cNvGrpSpPr/>
+                <p:nvPr/>
+              </p:nvGrpSpPr>
+              <p:grpSpPr>
+                <a:xfrm>
+                  <a:off x="1293341" y="4098760"/>
+                  <a:ext cx="2636961" cy="1067586"/>
+                  <a:chOff x="6867441" y="2184850"/>
+                  <a:chExt cx="4167398" cy="1687190"/>
+                </a:xfrm>
+                <a:grpFill/>
+              </p:grpSpPr>
+              <p:sp>
+                <p:nvSpPr>
+                  <p:cNvPr id="45" name="Pfeil: nach rechts 44">
+                    <a:extLst>
+                      <a:ext uri="{FF2B5EF4-FFF2-40B4-BE49-F238E27FC236}">
+                        <a16:creationId xmlns:a16="http://schemas.microsoft.com/office/drawing/2014/main" id="{D01E1013-DF7A-4E36-8ACC-D8EE09F5973E}"/>
+                      </a:ext>
+                    </a:extLst>
+                  </p:cNvPr>
+                  <p:cNvSpPr/>
+                  <p:nvPr/>
+                </p:nvSpPr>
+                <p:spPr>
+                  <a:xfrm>
+                    <a:off x="6867441" y="2184850"/>
+                    <a:ext cx="4167398" cy="801111"/>
+                  </a:xfrm>
+                  <a:prstGeom prst="rightArrow">
+                    <a:avLst/>
+                  </a:prstGeom>
+                  <a:grpFill/>
+                  <a:ln>
+                    <a:noFill/>
+                  </a:ln>
+                </p:spPr>
+                <p:style>
+                  <a:lnRef idx="2">
+                    <a:schemeClr val="accent1">
+                      <a:shade val="50000"/>
+                    </a:schemeClr>
+                  </a:lnRef>
+                  <a:fillRef idx="1">
+                    <a:schemeClr val="accent1"/>
+                  </a:fillRef>
+                  <a:effectRef idx="0">
+                    <a:schemeClr val="accent1"/>
+                  </a:effectRef>
+                  <a:fontRef idx="minor">
+                    <a:schemeClr val="lt1"/>
+                  </a:fontRef>
+                </p:style>
+                <p:txBody>
+                  <a:bodyPr rtlCol="0" anchor="ctr"/>
+                  <a:lstStyle/>
+                  <a:p>
+                    <a:pPr algn="ctr"/>
+                    <a:r>
+                      <a:rPr lang="en-US" dirty="0"/>
+                      <a:t>Ask about areas of risk</a:t>
+                    </a:r>
+                    <a:endParaRPr lang="de-DE" dirty="0"/>
+                  </a:p>
+                </p:txBody>
+              </p:sp>
+              <p:sp>
+                <p:nvSpPr>
+                  <p:cNvPr id="46" name="Pfeil: nach rechts 45">
+                    <a:extLst>
+                      <a:ext uri="{FF2B5EF4-FFF2-40B4-BE49-F238E27FC236}">
+                        <a16:creationId xmlns:a16="http://schemas.microsoft.com/office/drawing/2014/main" id="{BAB9B441-325F-4988-94A9-DF4B909B695C}"/>
+                      </a:ext>
+                    </a:extLst>
+                  </p:cNvPr>
+                  <p:cNvSpPr/>
+                  <p:nvPr/>
+                </p:nvSpPr>
+                <p:spPr>
+                  <a:xfrm>
+                    <a:off x="6867441" y="3070929"/>
+                    <a:ext cx="4167398" cy="801111"/>
+                  </a:xfrm>
+                  <a:prstGeom prst="rightArrow">
+                    <a:avLst/>
+                  </a:prstGeom>
+                  <a:grpFill/>
+                  <a:ln>
+                    <a:noFill/>
+                  </a:ln>
+                </p:spPr>
+                <p:style>
+                  <a:lnRef idx="2">
+                    <a:schemeClr val="accent1">
+                      <a:shade val="50000"/>
+                    </a:schemeClr>
+                  </a:lnRef>
+                  <a:fillRef idx="1">
+                    <a:schemeClr val="accent1"/>
+                  </a:fillRef>
+                  <a:effectRef idx="0">
+                    <a:schemeClr val="accent1"/>
+                  </a:effectRef>
+                  <a:fontRef idx="minor">
+                    <a:schemeClr val="lt1"/>
+                  </a:fontRef>
+                </p:style>
+                <p:txBody>
+                  <a:bodyPr rtlCol="0" anchor="ctr"/>
+                  <a:lstStyle/>
+                  <a:p>
+                    <a:pPr algn="ctr"/>
+                    <a:r>
+                      <a:rPr lang="en-US" dirty="0"/>
+                      <a:t>Provide own symptoms</a:t>
+                    </a:r>
+                    <a:endParaRPr lang="de-DE" dirty="0"/>
+                  </a:p>
+                </p:txBody>
+              </p:sp>
+            </p:grpSp>
+          </p:grpSp>
+        </p:grpSp>
+      </p:grpSp>
+      <p:grpSp>
+        <p:nvGrpSpPr>
+          <p:cNvPr id="3" name="Gruppieren 2">
+            <a:extLst>
+              <a:ext uri="{FF2B5EF4-FFF2-40B4-BE49-F238E27FC236}">
+                <a16:creationId xmlns:a16="http://schemas.microsoft.com/office/drawing/2014/main" id="{D0AD978E-07A7-4C7F-9FB3-F5F3147943D3}"/>
+              </a:ext>
+            </a:extLst>
+          </p:cNvPr>
+          <p:cNvGrpSpPr/>
+          <p:nvPr/>
+        </p:nvGrpSpPr>
+        <p:grpSpPr>
+          <a:xfrm>
+            <a:off x="183628" y="4071878"/>
+            <a:ext cx="1067586" cy="1603497"/>
+            <a:chOff x="183628" y="4071878"/>
+            <a:chExt cx="1067586" cy="1603497"/>
+          </a:xfrm>
+        </p:grpSpPr>
+        <p:pic>
+          <p:nvPicPr>
+            <p:cNvPr id="6" name="Grafik 5" descr="Laptop">
+              <a:extLst>
+                <a:ext uri="{FF2B5EF4-FFF2-40B4-BE49-F238E27FC236}">
+                  <a16:creationId xmlns:a16="http://schemas.microsoft.com/office/drawing/2014/main" id="{4CFA2C9A-F0C2-4040-A396-34BF283A378F}"/>
+                </a:ext>
+              </a:extLst>
+            </p:cNvPr>
+            <p:cNvPicPr>
+              <a:picLocks noChangeAspect="1"/>
+            </p:cNvPicPr>
+            <p:nvPr/>
+          </p:nvPicPr>
+          <p:blipFill>
+            <a:blip r:embed="rId4">
+              <a:extLst>
+                <a:ext uri="{28A0092B-C50C-407E-A947-70E740481C1C}">
+                  <a14:useLocalDpi xmlns:a14="http://schemas.microsoft.com/office/drawing/2010/main" val="0"/>
+                </a:ext>
+                <a:ext uri="{96DAC541-7B7A-43D3-8B79-37D633B846F1}">
+                  <asvg:svgBlip xmlns:asvg="http://schemas.microsoft.com/office/drawing/2016/SVG/main" r:embed="rId5"/>
+                </a:ext>
+              </a:extLst>
+            </a:blip>
+            <a:stretch>
+              <a:fillRect/>
+            </a:stretch>
+          </p:blipFill>
+          <p:spPr>
+            <a:xfrm>
+              <a:off x="183628" y="4071878"/>
+              <a:ext cx="1067586" cy="1067586"/>
+            </a:xfrm>
+            <a:prstGeom prst="rect">
+              <a:avLst/>
+            </a:prstGeom>
+          </p:spPr>
+        </p:pic>
+        <p:pic>
+          <p:nvPicPr>
+            <p:cNvPr id="25" name="Grafik 24" descr="Familie mit zwei Kindern">
+              <a:extLst>
+                <a:ext uri="{FF2B5EF4-FFF2-40B4-BE49-F238E27FC236}">
+                  <a16:creationId xmlns:a16="http://schemas.microsoft.com/office/drawing/2014/main" id="{F7908657-DCAD-47B7-9F9F-DB09ED36E9F7}"/>
+                </a:ext>
+              </a:extLst>
+            </p:cNvPr>
+            <p:cNvPicPr>
+              <a:picLocks noChangeAspect="1"/>
+            </p:cNvPicPr>
+            <p:nvPr/>
+          </p:nvPicPr>
+          <p:blipFill>
+            <a:blip r:embed="rId6">
+              <a:extLst>
+                <a:ext uri="{28A0092B-C50C-407E-A947-70E740481C1C}">
+                  <a14:useLocalDpi xmlns:a14="http://schemas.microsoft.com/office/drawing/2010/main" val="0"/>
+                </a:ext>
+                <a:ext uri="{96DAC541-7B7A-43D3-8B79-37D633B846F1}">
+                  <asvg:svgBlip xmlns:asvg="http://schemas.microsoft.com/office/drawing/2016/SVG/main" r:embed="rId7"/>
+                </a:ext>
+              </a:extLst>
+            </a:blip>
+            <a:stretch>
+              <a:fillRect/>
+            </a:stretch>
+          </p:blipFill>
+          <p:spPr>
+            <a:xfrm>
+              <a:off x="264888" y="4760975"/>
+              <a:ext cx="914400" cy="914400"/>
+            </a:xfrm>
+            <a:prstGeom prst="rect">
+              <a:avLst/>
+            </a:prstGeom>
+          </p:spPr>
+        </p:pic>
+        <p:sp>
+          <p:nvSpPr>
+            <p:cNvPr id="4" name="Smiley 3">
+              <a:extLst>
+                <a:ext uri="{FF2B5EF4-FFF2-40B4-BE49-F238E27FC236}">
+                  <a16:creationId xmlns:a16="http://schemas.microsoft.com/office/drawing/2014/main" id="{275E1520-C04B-4F4D-9B39-52FC4E1A3780}"/>
                 </a:ext>
               </a:extLst>
             </p:cNvPr>
@@ -4200,12 +3790,484 @@
           </p:nvSpPr>
           <p:spPr>
             <a:xfrm>
-              <a:off x="1157161" y="2184850"/>
-              <a:ext cx="4167398" cy="801111"/>
+              <a:off x="369607" y="4550897"/>
+              <a:ext cx="695628" cy="723985"/>
+            </a:xfrm>
+            <a:prstGeom prst="smileyFace">
+              <a:avLst/>
+            </a:prstGeom>
+            <a:solidFill>
+              <a:schemeClr val="accent4">
+                <a:lumMod val="60000"/>
+                <a:lumOff val="40000"/>
+                <a:alpha val="98000"/>
+              </a:schemeClr>
+            </a:solidFill>
+          </p:spPr>
+          <p:style>
+            <a:lnRef idx="2">
+              <a:schemeClr val="accent1">
+                <a:shade val="50000"/>
+              </a:schemeClr>
+            </a:lnRef>
+            <a:fillRef idx="1">
+              <a:schemeClr val="accent1"/>
+            </a:fillRef>
+            <a:effectRef idx="0">
+              <a:schemeClr val="accent1"/>
+            </a:effectRef>
+            <a:fontRef idx="minor">
+              <a:schemeClr val="lt1"/>
+            </a:fontRef>
+          </p:style>
+          <p:txBody>
+            <a:bodyPr rtlCol="0" anchor="ctr"/>
+            <a:lstStyle/>
+            <a:p>
+              <a:pPr algn="ctr"/>
+              <a:endParaRPr lang="en-US"/>
+            </a:p>
+          </p:txBody>
+        </p:sp>
+      </p:grpSp>
+      <p:grpSp>
+        <p:nvGrpSpPr>
+          <p:cNvPr id="22" name="Gruppieren 21">
+            <a:extLst>
+              <a:ext uri="{FF2B5EF4-FFF2-40B4-BE49-F238E27FC236}">
+                <a16:creationId xmlns:a16="http://schemas.microsoft.com/office/drawing/2014/main" id="{1AB88463-F9D1-4E55-B791-8EA96231A352}"/>
+              </a:ext>
+            </a:extLst>
+          </p:cNvPr>
+          <p:cNvGrpSpPr/>
+          <p:nvPr/>
+        </p:nvGrpSpPr>
+        <p:grpSpPr>
+          <a:xfrm>
+            <a:off x="9799128" y="3232233"/>
+            <a:ext cx="2199062" cy="2239964"/>
+            <a:chOff x="9839038" y="3216420"/>
+            <a:chExt cx="2199062" cy="2239964"/>
+          </a:xfrm>
+        </p:grpSpPr>
+        <p:pic>
+          <p:nvPicPr>
+            <p:cNvPr id="21" name="Grafik 20" descr="Schulgebäude">
+              <a:extLst>
+                <a:ext uri="{FF2B5EF4-FFF2-40B4-BE49-F238E27FC236}">
+                  <a16:creationId xmlns:a16="http://schemas.microsoft.com/office/drawing/2014/main" id="{55579701-B5F5-47D0-8688-315E3666F8DA}"/>
+                </a:ext>
+              </a:extLst>
+            </p:cNvPr>
+            <p:cNvPicPr>
+              <a:picLocks noChangeAspect="1"/>
+            </p:cNvPicPr>
+            <p:nvPr/>
+          </p:nvPicPr>
+          <p:blipFill>
+            <a:blip r:embed="rId8">
+              <a:extLst>
+                <a:ext uri="{28A0092B-C50C-407E-A947-70E740481C1C}">
+                  <a14:useLocalDpi xmlns:a14="http://schemas.microsoft.com/office/drawing/2010/main" val="0"/>
+                </a:ext>
+                <a:ext uri="{96DAC541-7B7A-43D3-8B79-37D633B846F1}">
+                  <asvg:svgBlip xmlns:asvg="http://schemas.microsoft.com/office/drawing/2016/SVG/main" r:embed="rId9"/>
+                </a:ext>
+              </a:extLst>
+            </a:blip>
+            <a:stretch>
+              <a:fillRect/>
+            </a:stretch>
+          </p:blipFill>
+          <p:spPr>
+            <a:xfrm>
+              <a:off x="9950026" y="3479298"/>
+              <a:ext cx="1977086" cy="1977086"/>
+            </a:xfrm>
+            <a:prstGeom prst="rect">
+              <a:avLst/>
+            </a:prstGeom>
+          </p:spPr>
+        </p:pic>
+        <p:sp>
+          <p:nvSpPr>
+            <p:cNvPr id="29" name="Textfeld 28">
+              <a:extLst>
+                <a:ext uri="{FF2B5EF4-FFF2-40B4-BE49-F238E27FC236}">
+                  <a16:creationId xmlns:a16="http://schemas.microsoft.com/office/drawing/2014/main" id="{0C9163BB-5F8A-4417-B0FB-451B2EC9B4D0}"/>
+                </a:ext>
+              </a:extLst>
+            </p:cNvPr>
+            <p:cNvSpPr txBox="1"/>
+            <p:nvPr/>
+          </p:nvSpPr>
+          <p:spPr>
+            <a:xfrm>
+              <a:off x="9839038" y="3216420"/>
+              <a:ext cx="2199062" cy="369332"/>
+            </a:xfrm>
+            <a:prstGeom prst="rect">
+              <a:avLst/>
+            </a:prstGeom>
+            <a:noFill/>
+            <a:ln w="12700">
+              <a:solidFill>
+                <a:schemeClr val="tx1"/>
+              </a:solidFill>
+            </a:ln>
+          </p:spPr>
+          <p:txBody>
+            <a:bodyPr wrap="square" rtlCol="0">
+              <a:spAutoFit/>
+            </a:bodyPr>
+            <a:lstStyle/>
+            <a:p>
+              <a:r>
+                <a:rPr lang="en-US" dirty="0"/>
+                <a:t>Robert Koch Institute</a:t>
+              </a:r>
+            </a:p>
+          </p:txBody>
+        </p:sp>
+      </p:grpSp>
+      <p:grpSp>
+        <p:nvGrpSpPr>
+          <p:cNvPr id="5" name="Gruppieren 4">
+            <a:extLst>
+              <a:ext uri="{FF2B5EF4-FFF2-40B4-BE49-F238E27FC236}">
+                <a16:creationId xmlns:a16="http://schemas.microsoft.com/office/drawing/2014/main" id="{B56E1B1C-1359-4E35-87F3-6D7DEB38E3AF}"/>
+              </a:ext>
+            </a:extLst>
+          </p:cNvPr>
+          <p:cNvGrpSpPr/>
+          <p:nvPr/>
+        </p:nvGrpSpPr>
+        <p:grpSpPr>
+          <a:xfrm>
+            <a:off x="3946514" y="3614001"/>
+            <a:ext cx="3351662" cy="1964931"/>
+            <a:chOff x="3946514" y="3614001"/>
+            <a:chExt cx="3351662" cy="1964931"/>
+          </a:xfrm>
+        </p:grpSpPr>
+        <p:sp>
+          <p:nvSpPr>
+            <p:cNvPr id="26" name="Rechteck: abgerundete Ecken 25">
+              <a:extLst>
+                <a:ext uri="{FF2B5EF4-FFF2-40B4-BE49-F238E27FC236}">
+                  <a16:creationId xmlns:a16="http://schemas.microsoft.com/office/drawing/2014/main" id="{2FDA9695-D13D-469D-867E-1061A9A0DF92}"/>
+                </a:ext>
+              </a:extLst>
+            </p:cNvPr>
+            <p:cNvSpPr/>
+            <p:nvPr/>
+          </p:nvSpPr>
+          <p:spPr>
+            <a:xfrm>
+              <a:off x="3946514" y="3614001"/>
+              <a:ext cx="3351662" cy="1964931"/>
+            </a:xfrm>
+            <a:prstGeom prst="roundRect">
+              <a:avLst/>
+            </a:prstGeom>
+            <a:solidFill>
+              <a:srgbClr val="740614"/>
+            </a:solidFill>
+            <a:ln>
+              <a:noFill/>
+            </a:ln>
+          </p:spPr>
+          <p:style>
+            <a:lnRef idx="2">
+              <a:schemeClr val="accent1">
+                <a:shade val="50000"/>
+              </a:schemeClr>
+            </a:lnRef>
+            <a:fillRef idx="1">
+              <a:schemeClr val="accent1"/>
+            </a:fillRef>
+            <a:effectRef idx="0">
+              <a:schemeClr val="accent1"/>
+            </a:effectRef>
+            <a:fontRef idx="minor">
+              <a:schemeClr val="lt1"/>
+            </a:fontRef>
+          </p:style>
+          <p:txBody>
+            <a:bodyPr rtlCol="0" anchor="ctr"/>
+            <a:lstStyle/>
+            <a:p>
+              <a:pPr algn="ctr"/>
+              <a:r>
+                <a:rPr lang="en-US" dirty="0">
+                  <a:solidFill>
+                    <a:schemeClr val="bg1"/>
+                  </a:solidFill>
+                </a:rPr>
+                <a:t>Artificial Neural Networks</a:t>
+              </a:r>
+            </a:p>
+            <a:p>
+              <a:pPr algn="ctr"/>
+              <a:endParaRPr lang="en-US" dirty="0">
+                <a:solidFill>
+                  <a:schemeClr val="tx1"/>
+                </a:solidFill>
+              </a:endParaRPr>
+            </a:p>
+            <a:p>
+              <a:pPr algn="ctr"/>
+              <a:endParaRPr lang="en-US" dirty="0"/>
+            </a:p>
+            <a:p>
+              <a:pPr algn="ctr"/>
+              <a:endParaRPr lang="en-US" dirty="0"/>
+            </a:p>
+            <a:p>
+              <a:pPr algn="ctr"/>
+              <a:endParaRPr lang="en-US" dirty="0"/>
+            </a:p>
+            <a:p>
+              <a:pPr algn="ctr"/>
+              <a:endParaRPr lang="en-US" dirty="0"/>
+            </a:p>
+          </p:txBody>
+        </p:sp>
+        <p:pic>
+          <p:nvPicPr>
+            <p:cNvPr id="9" name="Grafik 8" descr="Netzwerk">
+              <a:extLst>
+                <a:ext uri="{FF2B5EF4-FFF2-40B4-BE49-F238E27FC236}">
+                  <a16:creationId xmlns:a16="http://schemas.microsoft.com/office/drawing/2014/main" id="{6561F595-6058-4D9C-B12C-9928A16DD6A3}"/>
+                </a:ext>
+              </a:extLst>
+            </p:cNvPr>
+            <p:cNvPicPr>
+              <a:picLocks noChangeAspect="1"/>
+            </p:cNvPicPr>
+            <p:nvPr/>
+          </p:nvPicPr>
+          <p:blipFill>
+            <a:blip r:embed="rId10">
+              <a:extLst>
+                <a:ext uri="{28A0092B-C50C-407E-A947-70E740481C1C}">
+                  <a14:useLocalDpi xmlns:a14="http://schemas.microsoft.com/office/drawing/2010/main" val="0"/>
+                </a:ext>
+                <a:ext uri="{96DAC541-7B7A-43D3-8B79-37D633B846F1}">
+                  <asvg:svgBlip xmlns:asvg="http://schemas.microsoft.com/office/drawing/2016/SVG/main" r:embed="rId11"/>
+                </a:ext>
+              </a:extLst>
+            </a:blip>
+            <a:stretch>
+              <a:fillRect/>
+            </a:stretch>
+          </p:blipFill>
+          <p:spPr>
+            <a:xfrm>
+              <a:off x="4286346" y="3896686"/>
+              <a:ext cx="1646384" cy="1646384"/>
+            </a:xfrm>
+            <a:prstGeom prst="rect">
+              <a:avLst/>
+            </a:prstGeom>
+          </p:spPr>
+        </p:pic>
+        <p:pic>
+          <p:nvPicPr>
+            <p:cNvPr id="15" name="Grafik 14" descr="Zahnräder">
+              <a:extLst>
+                <a:ext uri="{FF2B5EF4-FFF2-40B4-BE49-F238E27FC236}">
+                  <a16:creationId xmlns:a16="http://schemas.microsoft.com/office/drawing/2014/main" id="{7C94C56A-81C4-4F5A-BB7A-0277DDC7D287}"/>
+                </a:ext>
+              </a:extLst>
+            </p:cNvPr>
+            <p:cNvPicPr>
+              <a:picLocks noChangeAspect="1"/>
+            </p:cNvPicPr>
+            <p:nvPr/>
+          </p:nvPicPr>
+          <p:blipFill>
+            <a:blip r:embed="rId12">
+              <a:extLst>
+                <a:ext uri="{28A0092B-C50C-407E-A947-70E740481C1C}">
+                  <a14:useLocalDpi xmlns:a14="http://schemas.microsoft.com/office/drawing/2010/main" val="0"/>
+                </a:ext>
+                <a:ext uri="{96DAC541-7B7A-43D3-8B79-37D633B846F1}">
+                  <asvg:svgBlip xmlns:asvg="http://schemas.microsoft.com/office/drawing/2016/SVG/main" r:embed="rId13"/>
+                </a:ext>
+              </a:extLst>
+            </a:blip>
+            <a:stretch>
+              <a:fillRect/>
+            </a:stretch>
+          </p:blipFill>
+          <p:spPr>
+            <a:xfrm>
+              <a:off x="5932730" y="4391809"/>
+              <a:ext cx="914400" cy="914400"/>
+            </a:xfrm>
+            <a:prstGeom prst="rect">
+              <a:avLst/>
+            </a:prstGeom>
+          </p:spPr>
+        </p:pic>
+      </p:grpSp>
+      <p:grpSp>
+        <p:nvGrpSpPr>
+          <p:cNvPr id="13" name="Gruppieren 12">
+            <a:extLst>
+              <a:ext uri="{FF2B5EF4-FFF2-40B4-BE49-F238E27FC236}">
+                <a16:creationId xmlns:a16="http://schemas.microsoft.com/office/drawing/2014/main" id="{EFD12163-2EF2-4FD9-A75B-581886A7DAAB}"/>
+              </a:ext>
+            </a:extLst>
+          </p:cNvPr>
+          <p:cNvGrpSpPr/>
+          <p:nvPr/>
+        </p:nvGrpSpPr>
+        <p:grpSpPr>
+          <a:xfrm>
+            <a:off x="3463383" y="69867"/>
+            <a:ext cx="4181843" cy="3531048"/>
+            <a:chOff x="3463383" y="69867"/>
+            <a:chExt cx="4181843" cy="3531048"/>
+          </a:xfrm>
+        </p:grpSpPr>
+        <p:pic>
+          <p:nvPicPr>
+            <p:cNvPr id="36" name="Grafik 35" descr="Bildschirmausschnitt">
+              <a:extLst>
+                <a:ext uri="{FF2B5EF4-FFF2-40B4-BE49-F238E27FC236}">
+                  <a16:creationId xmlns:a16="http://schemas.microsoft.com/office/drawing/2014/main" id="{DD4D45EF-4850-4340-A364-FC707B9C9756}"/>
+                </a:ext>
+              </a:extLst>
+            </p:cNvPr>
+            <p:cNvPicPr>
+              <a:picLocks noChangeAspect="1"/>
+            </p:cNvPicPr>
+            <p:nvPr/>
+          </p:nvPicPr>
+          <p:blipFill>
+            <a:blip r:embed="rId14">
+              <a:extLst>
+                <a:ext uri="{28A0092B-C50C-407E-A947-70E740481C1C}">
+                  <a14:useLocalDpi xmlns:a14="http://schemas.microsoft.com/office/drawing/2010/main" val="0"/>
+                </a:ext>
+              </a:extLst>
+            </a:blip>
+            <a:stretch>
+              <a:fillRect/>
+            </a:stretch>
+          </p:blipFill>
+          <p:spPr>
+            <a:xfrm>
+              <a:off x="3463383" y="69867"/>
+              <a:ext cx="4181843" cy="2672503"/>
+            </a:xfrm>
+            <a:prstGeom prst="rect">
+              <a:avLst/>
+            </a:prstGeom>
+          </p:spPr>
+        </p:pic>
+        <p:sp>
+          <p:nvSpPr>
+            <p:cNvPr id="37" name="Pfeil: nach rechts 36">
+              <a:extLst>
+                <a:ext uri="{FF2B5EF4-FFF2-40B4-BE49-F238E27FC236}">
+                  <a16:creationId xmlns:a16="http://schemas.microsoft.com/office/drawing/2014/main" id="{3FE47450-E088-4CC4-A98C-0F0FBE531F7C}"/>
+                </a:ext>
+              </a:extLst>
+            </p:cNvPr>
+            <p:cNvSpPr/>
+            <p:nvPr/>
+          </p:nvSpPr>
+          <p:spPr>
+            <a:xfrm rot="16200000">
+              <a:off x="5323059" y="2619168"/>
+              <a:ext cx="657989" cy="1305506"/>
             </a:xfrm>
             <a:prstGeom prst="rightArrow">
               <a:avLst/>
             </a:prstGeom>
+            <a:solidFill>
+              <a:srgbClr val="E1A2A9"/>
+            </a:solidFill>
+            <a:ln>
+              <a:noFill/>
+            </a:ln>
+          </p:spPr>
+          <p:style>
+            <a:lnRef idx="2">
+              <a:schemeClr val="accent1">
+                <a:shade val="50000"/>
+              </a:schemeClr>
+            </a:lnRef>
+            <a:fillRef idx="1">
+              <a:schemeClr val="accent1"/>
+            </a:fillRef>
+            <a:effectRef idx="0">
+              <a:schemeClr val="accent1"/>
+            </a:effectRef>
+            <a:fontRef idx="minor">
+              <a:schemeClr val="lt1"/>
+            </a:fontRef>
+          </p:style>
+          <p:txBody>
+            <a:bodyPr rtlCol="0" anchor="ctr"/>
+            <a:lstStyle/>
+            <a:p>
+              <a:pPr algn="ctr"/>
+              <a:endParaRPr lang="en-US" sz="1600" dirty="0"/>
+            </a:p>
+          </p:txBody>
+        </p:sp>
+      </p:grpSp>
+      <p:grpSp>
+        <p:nvGrpSpPr>
+          <p:cNvPr id="30" name="Gruppieren 29">
+            <a:extLst>
+              <a:ext uri="{FF2B5EF4-FFF2-40B4-BE49-F238E27FC236}">
+                <a16:creationId xmlns:a16="http://schemas.microsoft.com/office/drawing/2014/main" id="{81CFB77B-71FD-43C6-B58F-6196AD6A1FD9}"/>
+              </a:ext>
+            </a:extLst>
+          </p:cNvPr>
+          <p:cNvGrpSpPr/>
+          <p:nvPr/>
+        </p:nvGrpSpPr>
+        <p:grpSpPr>
+          <a:xfrm>
+            <a:off x="7336320" y="3814911"/>
+            <a:ext cx="2579545" cy="1559024"/>
+            <a:chOff x="1157161" y="2021042"/>
+            <a:chExt cx="4173843" cy="1850998"/>
+          </a:xfrm>
+          <a:solidFill>
+            <a:srgbClr val="E1A2A9"/>
+          </a:solidFill>
+        </p:grpSpPr>
+        <p:sp>
+          <p:nvSpPr>
+            <p:cNvPr id="35" name="Pfeil: nach rechts 34">
+              <a:extLst>
+                <a:ext uri="{FF2B5EF4-FFF2-40B4-BE49-F238E27FC236}">
+                  <a16:creationId xmlns:a16="http://schemas.microsoft.com/office/drawing/2014/main" id="{A3F41C5D-1C03-427B-98E5-4A2656BA53D9}"/>
+                </a:ext>
+              </a:extLst>
+            </p:cNvPr>
+            <p:cNvSpPr/>
+            <p:nvPr/>
+          </p:nvSpPr>
+          <p:spPr>
+            <a:xfrm>
+              <a:off x="1163606" y="2021042"/>
+              <a:ext cx="4167398" cy="1049887"/>
+            </a:xfrm>
+            <a:prstGeom prst="rightArrow">
+              <a:avLst/>
+            </a:prstGeom>
+            <a:grpFill/>
+            <a:ln>
+              <a:noFill/>
+            </a:ln>
           </p:spPr>
           <p:style>
             <a:lnRef idx="2">
@@ -4238,10 +4300,10 @@
         </p:sp>
         <p:sp>
           <p:nvSpPr>
-            <p:cNvPr id="5" name="Pfeil: nach rechts 4">
+            <p:cNvPr id="38" name="Pfeil: nach rechts 37">
               <a:extLst>
                 <a:ext uri="{FF2B5EF4-FFF2-40B4-BE49-F238E27FC236}">
-                  <a16:creationId xmlns:a16="http://schemas.microsoft.com/office/drawing/2014/main" id="{AAD36586-EDD5-4219-85C1-F0C1A52E03DE}"/>
+                  <a16:creationId xmlns:a16="http://schemas.microsoft.com/office/drawing/2014/main" id="{795D1A3C-8721-4983-9524-3B6799C2D3A7}"/>
                 </a:ext>
               </a:extLst>
             </p:cNvPr>
@@ -4250,12 +4312,16 @@
           </p:nvSpPr>
           <p:spPr>
             <a:xfrm flipH="1">
-              <a:off x="1157161" y="3070929"/>
-              <a:ext cx="4167398" cy="801111"/>
+              <a:off x="1157161" y="2822153"/>
+              <a:ext cx="4167398" cy="1049887"/>
             </a:xfrm>
             <a:prstGeom prst="rightArrow">
               <a:avLst/>
             </a:prstGeom>
+            <a:grpFill/>
+            <a:ln>
+              <a:noFill/>
+            </a:ln>
           </p:spPr>
           <p:style>
             <a:lnRef idx="2">
@@ -4280,19 +4346,94 @@
               <a:pPr algn="ctr"/>
               <a:r>
                 <a:rPr lang="en-US" dirty="0"/>
-                <a:t>Archived Data from Doctors</a:t>
+                <a:t>Archived health Data</a:t>
               </a:r>
               <a:endParaRPr lang="de-DE" dirty="0"/>
             </a:p>
           </p:txBody>
         </p:sp>
       </p:grpSp>
+      <p:pic>
+        <p:nvPicPr>
+          <p:cNvPr id="23" name="Grafik 22" descr="Medizin">
+            <a:extLst>
+              <a:ext uri="{FF2B5EF4-FFF2-40B4-BE49-F238E27FC236}">
+                <a16:creationId xmlns:a16="http://schemas.microsoft.com/office/drawing/2014/main" id="{683A0296-50A7-4282-90B4-3A34951AA00A}"/>
+              </a:ext>
+            </a:extLst>
+          </p:cNvPr>
+          <p:cNvPicPr>
+            <a:picLocks noChangeAspect="1"/>
+          </p:cNvPicPr>
+          <p:nvPr/>
+        </p:nvPicPr>
+        <p:blipFill>
+          <a:blip r:embed="rId15">
+            <a:extLst>
+              <a:ext uri="{28A0092B-C50C-407E-A947-70E740481C1C}">
+                <a14:useLocalDpi xmlns:a14="http://schemas.microsoft.com/office/drawing/2010/main" val="0"/>
+              </a:ext>
+              <a:ext uri="{96DAC541-7B7A-43D3-8B79-37D633B846F1}">
+                <asvg:svgBlip xmlns:asvg="http://schemas.microsoft.com/office/drawing/2016/SVG/main" r:embed="rId16"/>
+              </a:ext>
+            </a:extLst>
+          </a:blip>
+          <a:stretch>
+            <a:fillRect/>
+          </a:stretch>
+        </p:blipFill>
+        <p:spPr>
+          <a:xfrm>
+            <a:off x="5097105" y="5943600"/>
+            <a:ext cx="914400" cy="914400"/>
+          </a:xfrm>
+          <a:prstGeom prst="rect">
+            <a:avLst/>
+          </a:prstGeom>
+        </p:spPr>
+      </p:pic>
+      <p:sp>
+        <p:nvSpPr>
+          <p:cNvPr id="33" name="Textfeld 32">
+            <a:extLst>
+              <a:ext uri="{FF2B5EF4-FFF2-40B4-BE49-F238E27FC236}">
+                <a16:creationId xmlns:a16="http://schemas.microsoft.com/office/drawing/2014/main" id="{056FDC98-9B0E-4C9B-9652-9907BE50EA26}"/>
+              </a:ext>
+            </a:extLst>
+          </p:cNvPr>
+          <p:cNvSpPr txBox="1"/>
+          <p:nvPr/>
+        </p:nvSpPr>
+        <p:spPr>
+          <a:xfrm>
+            <a:off x="5029064" y="5629055"/>
+            <a:ext cx="1050480" cy="375254"/>
+          </a:xfrm>
+          <a:prstGeom prst="rect">
+            <a:avLst/>
+          </a:prstGeom>
+          <a:noFill/>
+        </p:spPr>
+        <p:txBody>
+          <a:bodyPr wrap="square" rtlCol="0">
+            <a:spAutoFit/>
+          </a:bodyPr>
+          <a:lstStyle/>
+          <a:p>
+            <a:pPr algn="ctr"/>
+            <a:r>
+              <a:rPr lang="en-US" dirty="0"/>
+              <a:t>Doctor</a:t>
+            </a:r>
+          </a:p>
+        </p:txBody>
+      </p:sp>
       <p:grpSp>
         <p:nvGrpSpPr>
-          <p:cNvPr id="9" name="Gruppieren 8">
-            <a:extLst>
-              <a:ext uri="{FF2B5EF4-FFF2-40B4-BE49-F238E27FC236}">
-                <a16:creationId xmlns:a16="http://schemas.microsoft.com/office/drawing/2014/main" id="{81C3A725-A5CA-4330-82EA-61CD26CAF7B7}"/>
+          <p:cNvPr id="7" name="Gruppieren 6">
+            <a:extLst>
+              <a:ext uri="{FF2B5EF4-FFF2-40B4-BE49-F238E27FC236}">
+                <a16:creationId xmlns:a16="http://schemas.microsoft.com/office/drawing/2014/main" id="{4EE29AE7-D89A-452E-A5C4-B01E9A2D8594}"/>
               </a:ext>
             </a:extLst>
           </p:cNvPr>
@@ -4301,18 +4442,21 @@
         </p:nvGrpSpPr>
         <p:grpSpPr>
           <a:xfrm>
-            <a:off x="6867441" y="2184850"/>
-            <a:ext cx="4167398" cy="1687190"/>
-            <a:chOff x="6867441" y="2184850"/>
-            <a:chExt cx="4167398" cy="1687190"/>
+            <a:off x="596435" y="5373935"/>
+            <a:ext cx="10597959" cy="1404145"/>
+            <a:chOff x="596435" y="5373935"/>
+            <a:chExt cx="10597959" cy="1404145"/>
           </a:xfrm>
+          <a:solidFill>
+            <a:srgbClr val="E1A2A9"/>
+          </a:solidFill>
         </p:grpSpPr>
         <p:sp>
           <p:nvSpPr>
-            <p:cNvPr id="7" name="Pfeil: nach rechts 6">
+            <p:cNvPr id="11" name="Pfeil: nach oben gebogen 10">
               <a:extLst>
                 <a:ext uri="{FF2B5EF4-FFF2-40B4-BE49-F238E27FC236}">
-                  <a16:creationId xmlns:a16="http://schemas.microsoft.com/office/drawing/2014/main" id="{ED43331A-3036-44B9-86B3-953088A6E139}"/>
+                  <a16:creationId xmlns:a16="http://schemas.microsoft.com/office/drawing/2014/main" id="{3B732B92-7BD5-4268-8CC1-92FC10C041E3}"/>
                 </a:ext>
               </a:extLst>
             </p:cNvPr>
@@ -4321,12 +4465,16 @@
           </p:nvSpPr>
           <p:spPr>
             <a:xfrm>
-              <a:off x="6867441" y="2184850"/>
-              <a:ext cx="4167398" cy="801111"/>
+              <a:off x="6011505" y="5373935"/>
+              <a:ext cx="5182889" cy="1210271"/>
             </a:xfrm>
-            <a:prstGeom prst="rightArrow">
+            <a:prstGeom prst="bentUpArrow">
               <a:avLst/>
             </a:prstGeom>
+            <a:grpFill/>
+            <a:ln>
+              <a:noFill/>
+            </a:ln>
           </p:spPr>
           <p:style>
             <a:lnRef idx="2">
@@ -4351,7 +4499,7 @@
               <a:pPr algn="ctr"/>
               <a:r>
                 <a:rPr lang="en-US" dirty="0"/>
-                <a:t>Ask about areas of risk</a:t>
+                <a:t>Provides diagnosis</a:t>
               </a:r>
               <a:endParaRPr lang="de-DE" dirty="0"/>
             </a:p>
@@ -4359,10 +4507,10 @@
         </p:sp>
         <p:sp>
           <p:nvSpPr>
-            <p:cNvPr id="8" name="Pfeil: nach rechts 7">
+            <p:cNvPr id="48" name="Pfeil: nach oben gebogen 47">
               <a:extLst>
                 <a:ext uri="{FF2B5EF4-FFF2-40B4-BE49-F238E27FC236}">
-                  <a16:creationId xmlns:a16="http://schemas.microsoft.com/office/drawing/2014/main" id="{3F80D919-EF56-4406-BDCB-3732BB4D7D4B}"/>
+                  <a16:creationId xmlns:a16="http://schemas.microsoft.com/office/drawing/2014/main" id="{D4F60281-3799-4B6F-98B9-A9DD6FCA304C}"/>
                 </a:ext>
               </a:extLst>
             </p:cNvPr>
@@ -4370,13 +4518,180 @@
             <p:nvPr/>
           </p:nvSpPr>
           <p:spPr>
+            <a:xfrm rot="5400000">
+              <a:off x="2240150" y="3921126"/>
+              <a:ext cx="1213239" cy="4500669"/>
+            </a:xfrm>
+            <a:prstGeom prst="bentUpArrow">
+              <a:avLst>
+                <a:gd name="adj1" fmla="val 25000"/>
+                <a:gd name="adj2" fmla="val 30876"/>
+                <a:gd name="adj3" fmla="val 25000"/>
+              </a:avLst>
+            </a:prstGeom>
+            <a:grpFill/>
+            <a:ln>
+              <a:noFill/>
+            </a:ln>
+          </p:spPr>
+          <p:style>
+            <a:lnRef idx="2">
+              <a:schemeClr val="accent1">
+                <a:shade val="50000"/>
+              </a:schemeClr>
+            </a:lnRef>
+            <a:fillRef idx="1">
+              <a:schemeClr val="accent1"/>
+            </a:fillRef>
+            <a:effectRef idx="0">
+              <a:schemeClr val="accent1"/>
+            </a:effectRef>
+            <a:fontRef idx="minor">
+              <a:schemeClr val="lt1"/>
+            </a:fontRef>
+          </p:style>
+          <p:txBody>
+            <a:bodyPr rtlCol="0" anchor="ctr"/>
+            <a:lstStyle/>
+            <a:p>
+              <a:pPr algn="ctr"/>
+              <a:endParaRPr lang="de-DE" dirty="0"/>
+            </a:p>
+          </p:txBody>
+        </p:sp>
+        <p:sp>
+          <p:nvSpPr>
+            <p:cNvPr id="12" name="Textfeld 11">
+              <a:extLst>
+                <a:ext uri="{FF2B5EF4-FFF2-40B4-BE49-F238E27FC236}">
+                  <a16:creationId xmlns:a16="http://schemas.microsoft.com/office/drawing/2014/main" id="{0F30BC51-5B4B-4004-B996-C2B03F319453}"/>
+                </a:ext>
+              </a:extLst>
+            </p:cNvPr>
+            <p:cNvSpPr txBox="1"/>
+            <p:nvPr/>
+          </p:nvSpPr>
+          <p:spPr>
             <a:xfrm>
-              <a:off x="6867441" y="3070929"/>
-              <a:ext cx="4167398" cy="801111"/>
+              <a:off x="1972660" y="6217130"/>
+              <a:ext cx="1758384" cy="369332"/>
+            </a:xfrm>
+            <a:prstGeom prst="rect">
+              <a:avLst/>
+            </a:prstGeom>
+            <a:noFill/>
+            <a:ln>
+              <a:noFill/>
+            </a:ln>
+          </p:spPr>
+          <p:txBody>
+            <a:bodyPr wrap="square" rtlCol="0">
+              <a:spAutoFit/>
+            </a:bodyPr>
+            <a:lstStyle/>
+            <a:p>
+              <a:r>
+                <a:rPr lang="en-US" dirty="0">
+                  <a:solidFill>
+                    <a:schemeClr val="bg1"/>
+                  </a:solidFill>
+                </a:rPr>
+                <a:t>Visits doctor</a:t>
+              </a:r>
+              <a:endParaRPr lang="de-DE" dirty="0">
+                <a:solidFill>
+                  <a:schemeClr val="bg1"/>
+                </a:solidFill>
+              </a:endParaRPr>
+            </a:p>
+          </p:txBody>
+        </p:sp>
+      </p:grpSp>
+      <p:grpSp>
+        <p:nvGrpSpPr>
+          <p:cNvPr id="8" name="Gruppieren 7">
+            <a:extLst>
+              <a:ext uri="{FF2B5EF4-FFF2-40B4-BE49-F238E27FC236}">
+                <a16:creationId xmlns:a16="http://schemas.microsoft.com/office/drawing/2014/main" id="{6B257ECE-40C5-4893-B7F3-0570C876E665}"/>
+              </a:ext>
+            </a:extLst>
+          </p:cNvPr>
+          <p:cNvGrpSpPr/>
+          <p:nvPr/>
+        </p:nvGrpSpPr>
+        <p:grpSpPr>
+          <a:xfrm>
+            <a:off x="264888" y="110974"/>
+            <a:ext cx="2913944" cy="4355648"/>
+            <a:chOff x="264888" y="110974"/>
+            <a:chExt cx="2913944" cy="4355648"/>
+          </a:xfrm>
+        </p:grpSpPr>
+        <p:pic>
+          <p:nvPicPr>
+            <p:cNvPr id="39" name="Grafik 38">
+              <a:extLst>
+                <a:ext uri="{FF2B5EF4-FFF2-40B4-BE49-F238E27FC236}">
+                  <a16:creationId xmlns:a16="http://schemas.microsoft.com/office/drawing/2014/main" id="{748EE7D9-0969-4B5E-8F6F-06ADAFF4D9E7}"/>
+                </a:ext>
+              </a:extLst>
+            </p:cNvPr>
+            <p:cNvPicPr>
+              <a:picLocks noChangeAspect="1"/>
+            </p:cNvPicPr>
+            <p:nvPr/>
+          </p:nvPicPr>
+          <p:blipFill>
+            <a:blip r:embed="rId17">
+              <a:extLst>
+                <a:ext uri="{28A0092B-C50C-407E-A947-70E740481C1C}">
+                  <a14:useLocalDpi xmlns:a14="http://schemas.microsoft.com/office/drawing/2010/main" val="0"/>
+                </a:ext>
+              </a:extLst>
+            </a:blip>
+            <a:stretch>
+              <a:fillRect/>
+            </a:stretch>
+          </p:blipFill>
+          <p:spPr>
+            <a:xfrm flipH="1">
+              <a:off x="1672793" y="110974"/>
+              <a:ext cx="898480" cy="720400"/>
+            </a:xfrm>
+            <a:prstGeom prst="rect">
+              <a:avLst/>
+            </a:prstGeom>
+            <a:ln>
+              <a:noFill/>
+            </a:ln>
+          </p:spPr>
+        </p:pic>
+        <p:sp>
+          <p:nvSpPr>
+            <p:cNvPr id="40" name="Pfeil: nach rechts 39">
+              <a:extLst>
+                <a:ext uri="{FF2B5EF4-FFF2-40B4-BE49-F238E27FC236}">
+                  <a16:creationId xmlns:a16="http://schemas.microsoft.com/office/drawing/2014/main" id="{7BC95FC3-DB73-40A9-943A-FA69780D4576}"/>
+                </a:ext>
+              </a:extLst>
+            </p:cNvPr>
+            <p:cNvSpPr/>
+            <p:nvPr/>
+          </p:nvSpPr>
+          <p:spPr>
+            <a:xfrm flipH="1">
+              <a:off x="1065235" y="831621"/>
+              <a:ext cx="2113597" cy="573319"/>
             </a:xfrm>
             <a:prstGeom prst="rightArrow">
               <a:avLst/>
             </a:prstGeom>
+            <a:solidFill>
+              <a:srgbClr val="E1A2A9"/>
+            </a:solidFill>
+            <a:ln>
+              <a:noFill/>
+            </a:ln>
           </p:spPr>
           <p:style>
             <a:lnRef idx="2">
@@ -4400,24 +4715,578 @@
             <a:p>
               <a:pPr algn="ctr"/>
               <a:r>
-                <a:rPr lang="en-US" dirty="0"/>
-                <a:t>Provide own symptoms</a:t>
+                <a:rPr lang="en-US" sz="1600" dirty="0"/>
+                <a:t>Local Risk Alerts</a:t>
               </a:r>
-              <a:endParaRPr lang="de-DE" dirty="0"/>
             </a:p>
           </p:txBody>
         </p:sp>
+        <p:pic>
+          <p:nvPicPr>
+            <p:cNvPr id="42" name="Grafik 41" descr="Smartphone">
+              <a:extLst>
+                <a:ext uri="{FF2B5EF4-FFF2-40B4-BE49-F238E27FC236}">
+                  <a16:creationId xmlns:a16="http://schemas.microsoft.com/office/drawing/2014/main" id="{88C2F060-B21E-4F07-9D74-CE916A28BA16}"/>
+                </a:ext>
+              </a:extLst>
+            </p:cNvPr>
+            <p:cNvPicPr>
+              <a:picLocks noChangeAspect="1"/>
+            </p:cNvPicPr>
+            <p:nvPr/>
+          </p:nvPicPr>
+          <p:blipFill>
+            <a:blip r:embed="rId18">
+              <a:extLst>
+                <a:ext uri="{28A0092B-C50C-407E-A947-70E740481C1C}">
+                  <a14:useLocalDpi xmlns:a14="http://schemas.microsoft.com/office/drawing/2010/main" val="0"/>
+                </a:ext>
+                <a:ext uri="{96DAC541-7B7A-43D3-8B79-37D633B846F1}">
+                  <asvg:svgBlip xmlns:asvg="http://schemas.microsoft.com/office/drawing/2016/SVG/main" r:embed="rId19"/>
+                </a:ext>
+              </a:extLst>
+            </a:blip>
+            <a:stretch>
+              <a:fillRect/>
+            </a:stretch>
+          </p:blipFill>
+          <p:spPr>
+            <a:xfrm>
+              <a:off x="264888" y="661080"/>
+              <a:ext cx="914400" cy="914400"/>
+            </a:xfrm>
+            <a:prstGeom prst="rect">
+              <a:avLst/>
+            </a:prstGeom>
+          </p:spPr>
+        </p:pic>
+        <p:cxnSp>
+          <p:nvCxnSpPr>
+            <p:cNvPr id="18" name="Gerade Verbindung mit Pfeil 17">
+              <a:extLst>
+                <a:ext uri="{FF2B5EF4-FFF2-40B4-BE49-F238E27FC236}">
+                  <a16:creationId xmlns:a16="http://schemas.microsoft.com/office/drawing/2014/main" id="{8B2C0A8D-F33E-4ED2-9CA2-055A29A6CF0F}"/>
+                </a:ext>
+              </a:extLst>
+            </p:cNvPr>
+            <p:cNvCxnSpPr>
+              <a:cxnSpLocks/>
+            </p:cNvCxnSpPr>
+            <p:nvPr/>
+          </p:nvCxnSpPr>
+          <p:spPr>
+            <a:xfrm flipH="1">
+              <a:off x="717421" y="1720142"/>
+              <a:ext cx="1" cy="2746480"/>
+            </a:xfrm>
+            <a:prstGeom prst="straightConnector1">
+              <a:avLst/>
+            </a:prstGeom>
+            <a:ln w="63500">
+              <a:solidFill>
+                <a:srgbClr val="E1A2A9"/>
+              </a:solidFill>
+              <a:prstDash val="sysDash"/>
+              <a:tailEnd type="triangle"/>
+            </a:ln>
+          </p:spPr>
+          <p:style>
+            <a:lnRef idx="1">
+              <a:schemeClr val="accent1"/>
+            </a:lnRef>
+            <a:fillRef idx="0">
+              <a:schemeClr val="accent1"/>
+            </a:fillRef>
+            <a:effectRef idx="0">
+              <a:schemeClr val="accent1"/>
+            </a:effectRef>
+            <a:fontRef idx="minor">
+              <a:schemeClr val="tx1"/>
+            </a:fontRef>
+          </p:style>
+        </p:cxnSp>
       </p:grpSp>
+      <p:pic>
+        <p:nvPicPr>
+          <p:cNvPr id="17" name="Grafik 16" descr="Mikroskop">
+            <a:extLst>
+              <a:ext uri="{FF2B5EF4-FFF2-40B4-BE49-F238E27FC236}">
+                <a16:creationId xmlns:a16="http://schemas.microsoft.com/office/drawing/2014/main" id="{350DD76A-1463-465B-91A6-E56C6D806BBB}"/>
+              </a:ext>
+            </a:extLst>
+          </p:cNvPr>
+          <p:cNvPicPr>
+            <a:picLocks noChangeAspect="1"/>
+          </p:cNvPicPr>
+          <p:nvPr/>
+        </p:nvPicPr>
+        <p:blipFill>
+          <a:blip r:embed="rId20">
+            <a:extLst>
+              <a:ext uri="{28A0092B-C50C-407E-A947-70E740481C1C}">
+                <a14:useLocalDpi xmlns:a14="http://schemas.microsoft.com/office/drawing/2010/main" val="0"/>
+              </a:ext>
+              <a:ext uri="{96DAC541-7B7A-43D3-8B79-37D633B846F1}">
+                <asvg:svgBlip xmlns:asvg="http://schemas.microsoft.com/office/drawing/2016/SVG/main" r:embed="rId21"/>
+              </a:ext>
+            </a:extLst>
+          </a:blip>
+          <a:stretch>
+            <a:fillRect/>
+          </a:stretch>
+        </p:blipFill>
+        <p:spPr>
+          <a:xfrm>
+            <a:off x="10481369" y="661080"/>
+            <a:ext cx="914400" cy="914400"/>
+          </a:xfrm>
+          <a:prstGeom prst="rect">
+            <a:avLst/>
+          </a:prstGeom>
+        </p:spPr>
+      </p:pic>
+      <p:sp>
+        <p:nvSpPr>
+          <p:cNvPr id="20" name="Pfeil: nach oben 19">
+            <a:extLst>
+              <a:ext uri="{FF2B5EF4-FFF2-40B4-BE49-F238E27FC236}">
+                <a16:creationId xmlns:a16="http://schemas.microsoft.com/office/drawing/2014/main" id="{454564B3-B669-4C8D-9ED3-961FAD2C3E59}"/>
+              </a:ext>
+            </a:extLst>
+          </p:cNvPr>
+          <p:cNvSpPr/>
+          <p:nvPr/>
+        </p:nvSpPr>
+        <p:spPr>
+          <a:xfrm>
+            <a:off x="10644662" y="1720142"/>
+            <a:ext cx="507993" cy="1399833"/>
+          </a:xfrm>
+          <a:prstGeom prst="upArrow">
+            <a:avLst/>
+          </a:prstGeom>
+          <a:solidFill>
+            <a:srgbClr val="E1A2A9"/>
+          </a:solidFill>
+          <a:ln>
+            <a:noFill/>
+          </a:ln>
+        </p:spPr>
+        <p:style>
+          <a:lnRef idx="2">
+            <a:schemeClr val="accent1">
+              <a:shade val="50000"/>
+            </a:schemeClr>
+          </a:lnRef>
+          <a:fillRef idx="1">
+            <a:schemeClr val="accent1"/>
+          </a:fillRef>
+          <a:effectRef idx="0">
+            <a:schemeClr val="accent1"/>
+          </a:effectRef>
+          <a:fontRef idx="minor">
+            <a:schemeClr val="lt1"/>
+          </a:fontRef>
+        </p:style>
+        <p:txBody>
+          <a:bodyPr rtlCol="0" anchor="ctr"/>
+          <a:lstStyle/>
+          <a:p>
+            <a:pPr algn="ctr"/>
+            <a:endParaRPr lang="de-DE"/>
+          </a:p>
+        </p:txBody>
+      </p:sp>
+      <p:sp>
+        <p:nvSpPr>
+          <p:cNvPr id="47" name="Textfeld 46">
+            <a:extLst>
+              <a:ext uri="{FF2B5EF4-FFF2-40B4-BE49-F238E27FC236}">
+                <a16:creationId xmlns:a16="http://schemas.microsoft.com/office/drawing/2014/main" id="{BC452529-A6CC-4A7D-A965-96E0CD7EF44A}"/>
+              </a:ext>
+            </a:extLst>
+          </p:cNvPr>
+          <p:cNvSpPr txBox="1"/>
+          <p:nvPr/>
+        </p:nvSpPr>
+        <p:spPr>
+          <a:xfrm>
+            <a:off x="10045662" y="286508"/>
+            <a:ext cx="1785813" cy="369332"/>
+          </a:xfrm>
+          <a:prstGeom prst="rect">
+            <a:avLst/>
+          </a:prstGeom>
+          <a:noFill/>
+          <a:ln>
+            <a:noFill/>
+          </a:ln>
+        </p:spPr>
+        <p:txBody>
+          <a:bodyPr wrap="square" rtlCol="0">
+            <a:spAutoFit/>
+          </a:bodyPr>
+          <a:lstStyle/>
+          <a:p>
+            <a:pPr algn="ctr"/>
+            <a:r>
+              <a:rPr lang="en-US" dirty="0">
+                <a:cs typeface="Arial" panose="020B0604020202020204" pitchFamily="34" charset="0"/>
+              </a:rPr>
+              <a:t>Future Research</a:t>
+            </a:r>
+          </a:p>
+        </p:txBody>
+      </p:sp>
     </p:spTree>
     <p:extLst>
       <p:ext uri="{BB962C8B-B14F-4D97-AF65-F5344CB8AC3E}">
-        <p14:creationId xmlns:p14="http://schemas.microsoft.com/office/powerpoint/2010/main" val="3185269482"/>
+        <p14:creationId xmlns:p14="http://schemas.microsoft.com/office/powerpoint/2010/main" val="2220378987"/>
       </p:ext>
     </p:extLst>
   </p:cSld>
   <p:clrMapOvr>
     <a:masterClrMapping/>
   </p:clrMapOvr>
+  <p:timing>
+    <p:tnLst>
+      <p:par>
+        <p:cTn id="1" dur="indefinite" restart="never" nodeType="tmRoot">
+          <p:childTnLst>
+            <p:seq concurrent="1" nextAc="seek">
+              <p:cTn id="2" dur="indefinite" nodeType="mainSeq">
+                <p:childTnLst>
+                  <p:par>
+                    <p:cTn id="3" fill="hold">
+                      <p:stCondLst>
+                        <p:cond delay="indefinite"/>
+                      </p:stCondLst>
+                      <p:childTnLst>
+                        <p:par>
+                          <p:cTn id="4" fill="hold">
+                            <p:stCondLst>
+                              <p:cond delay="0"/>
+                            </p:stCondLst>
+                            <p:childTnLst>
+                              <p:par>
+                                <p:cTn id="5" presetID="10" presetClass="entr" presetSubtype="0" fill="hold" nodeType="clickEffect">
+                                  <p:stCondLst>
+                                    <p:cond delay="0"/>
+                                  </p:stCondLst>
+                                  <p:childTnLst>
+                                    <p:set>
+                                      <p:cBhvr>
+                                        <p:cTn id="6" dur="1" fill="hold">
+                                          <p:stCondLst>
+                                            <p:cond delay="0"/>
+                                          </p:stCondLst>
+                                        </p:cTn>
+                                        <p:tgtEl>
+                                          <p:spTgt spid="7"/>
+                                        </p:tgtEl>
+                                        <p:attrNameLst>
+                                          <p:attrName>style.visibility</p:attrName>
+                                        </p:attrNameLst>
+                                      </p:cBhvr>
+                                      <p:to>
+                                        <p:strVal val="visible"/>
+                                      </p:to>
+                                    </p:set>
+                                    <p:animEffect transition="in" filter="fade">
+                                      <p:cBhvr>
+                                        <p:cTn id="7" dur="2000"/>
+                                        <p:tgtEl>
+                                          <p:spTgt spid="7"/>
+                                        </p:tgtEl>
+                                      </p:cBhvr>
+                                    </p:animEffect>
+                                  </p:childTnLst>
+                                </p:cTn>
+                              </p:par>
+                            </p:childTnLst>
+                          </p:cTn>
+                        </p:par>
+                      </p:childTnLst>
+                    </p:cTn>
+                  </p:par>
+                  <p:par>
+                    <p:cTn id="8" fill="hold">
+                      <p:stCondLst>
+                        <p:cond delay="indefinite"/>
+                      </p:stCondLst>
+                      <p:childTnLst>
+                        <p:par>
+                          <p:cTn id="9" fill="hold">
+                            <p:stCondLst>
+                              <p:cond delay="0"/>
+                            </p:stCondLst>
+                            <p:childTnLst>
+                              <p:par>
+                                <p:cTn id="10" presetID="10" presetClass="entr" presetSubtype="0" fill="hold" nodeType="clickEffect">
+                                  <p:stCondLst>
+                                    <p:cond delay="0"/>
+                                  </p:stCondLst>
+                                  <p:childTnLst>
+                                    <p:set>
+                                      <p:cBhvr>
+                                        <p:cTn id="11" dur="1" fill="hold">
+                                          <p:stCondLst>
+                                            <p:cond delay="0"/>
+                                          </p:stCondLst>
+                                        </p:cTn>
+                                        <p:tgtEl>
+                                          <p:spTgt spid="30"/>
+                                        </p:tgtEl>
+                                        <p:attrNameLst>
+                                          <p:attrName>style.visibility</p:attrName>
+                                        </p:attrNameLst>
+                                      </p:cBhvr>
+                                      <p:to>
+                                        <p:strVal val="visible"/>
+                                      </p:to>
+                                    </p:set>
+                                    <p:animEffect transition="in" filter="fade">
+                                      <p:cBhvr>
+                                        <p:cTn id="12" dur="2000"/>
+                                        <p:tgtEl>
+                                          <p:spTgt spid="30"/>
+                                        </p:tgtEl>
+                                      </p:cBhvr>
+                                    </p:animEffect>
+                                  </p:childTnLst>
+                                </p:cTn>
+                              </p:par>
+                            </p:childTnLst>
+                          </p:cTn>
+                        </p:par>
+                      </p:childTnLst>
+                    </p:cTn>
+                  </p:par>
+                  <p:par>
+                    <p:cTn id="13" fill="hold">
+                      <p:stCondLst>
+                        <p:cond delay="indefinite"/>
+                      </p:stCondLst>
+                      <p:childTnLst>
+                        <p:par>
+                          <p:cTn id="14" fill="hold">
+                            <p:stCondLst>
+                              <p:cond delay="0"/>
+                            </p:stCondLst>
+                            <p:childTnLst>
+                              <p:par>
+                                <p:cTn id="15" presetID="10" presetClass="entr" presetSubtype="0" fill="hold" nodeType="clickEffect">
+                                  <p:stCondLst>
+                                    <p:cond delay="0"/>
+                                  </p:stCondLst>
+                                  <p:childTnLst>
+                                    <p:set>
+                                      <p:cBhvr>
+                                        <p:cTn id="16" dur="1" fill="hold">
+                                          <p:stCondLst>
+                                            <p:cond delay="0"/>
+                                          </p:stCondLst>
+                                        </p:cTn>
+                                        <p:tgtEl>
+                                          <p:spTgt spid="16"/>
+                                        </p:tgtEl>
+                                        <p:attrNameLst>
+                                          <p:attrName>style.visibility</p:attrName>
+                                        </p:attrNameLst>
+                                      </p:cBhvr>
+                                      <p:to>
+                                        <p:strVal val="visible"/>
+                                      </p:to>
+                                    </p:set>
+                                    <p:animEffect transition="in" filter="fade">
+                                      <p:cBhvr>
+                                        <p:cTn id="17" dur="2000"/>
+                                        <p:tgtEl>
+                                          <p:spTgt spid="16"/>
+                                        </p:tgtEl>
+                                      </p:cBhvr>
+                                    </p:animEffect>
+                                  </p:childTnLst>
+                                </p:cTn>
+                              </p:par>
+                            </p:childTnLst>
+                          </p:cTn>
+                        </p:par>
+                      </p:childTnLst>
+                    </p:cTn>
+                  </p:par>
+                  <p:par>
+                    <p:cTn id="18" fill="hold">
+                      <p:stCondLst>
+                        <p:cond delay="indefinite"/>
+                      </p:stCondLst>
+                      <p:childTnLst>
+                        <p:par>
+                          <p:cTn id="19" fill="hold">
+                            <p:stCondLst>
+                              <p:cond delay="0"/>
+                            </p:stCondLst>
+                            <p:childTnLst>
+                              <p:par>
+                                <p:cTn id="20" presetID="26" presetClass="emph" presetSubtype="0" fill="hold" nodeType="clickEffect">
+                                  <p:stCondLst>
+                                    <p:cond delay="0"/>
+                                  </p:stCondLst>
+                                  <p:childTnLst>
+                                    <p:animEffect transition="out" filter="fade">
+                                      <p:cBhvr>
+                                        <p:cTn id="21" dur="1500" tmFilter="0, 0; .2, .5; .8, .5; 1, 0"/>
+                                        <p:tgtEl>
+                                          <p:spTgt spid="16"/>
+                                        </p:tgtEl>
+                                      </p:cBhvr>
+                                    </p:animEffect>
+                                    <p:animScale>
+                                      <p:cBhvr>
+                                        <p:cTn id="22" dur="750" autoRev="1" fill="hold"/>
+                                        <p:tgtEl>
+                                          <p:spTgt spid="16"/>
+                                        </p:tgtEl>
+                                      </p:cBhvr>
+                                      <p:by x="105000" y="105000"/>
+                                    </p:animScale>
+                                  </p:childTnLst>
+                                </p:cTn>
+                              </p:par>
+                            </p:childTnLst>
+                          </p:cTn>
+                        </p:par>
+                      </p:childTnLst>
+                    </p:cTn>
+                  </p:par>
+                  <p:par>
+                    <p:cTn id="23" fill="hold">
+                      <p:stCondLst>
+                        <p:cond delay="indefinite"/>
+                      </p:stCondLst>
+                      <p:childTnLst>
+                        <p:par>
+                          <p:cTn id="24" fill="hold">
+                            <p:stCondLst>
+                              <p:cond delay="0"/>
+                            </p:stCondLst>
+                            <p:childTnLst>
+                              <p:par>
+                                <p:cTn id="25" presetID="10" presetClass="entr" presetSubtype="0" fill="hold" nodeType="clickEffect">
+                                  <p:stCondLst>
+                                    <p:cond delay="0"/>
+                                  </p:stCondLst>
+                                  <p:childTnLst>
+                                    <p:set>
+                                      <p:cBhvr>
+                                        <p:cTn id="26" dur="1" fill="hold">
+                                          <p:stCondLst>
+                                            <p:cond delay="0"/>
+                                          </p:stCondLst>
+                                        </p:cTn>
+                                        <p:tgtEl>
+                                          <p:spTgt spid="13"/>
+                                        </p:tgtEl>
+                                        <p:attrNameLst>
+                                          <p:attrName>style.visibility</p:attrName>
+                                        </p:attrNameLst>
+                                      </p:cBhvr>
+                                      <p:to>
+                                        <p:strVal val="visible"/>
+                                      </p:to>
+                                    </p:set>
+                                    <p:animEffect transition="in" filter="fade">
+                                      <p:cBhvr>
+                                        <p:cTn id="27" dur="2000"/>
+                                        <p:tgtEl>
+                                          <p:spTgt spid="13"/>
+                                        </p:tgtEl>
+                                      </p:cBhvr>
+                                    </p:animEffect>
+                                  </p:childTnLst>
+                                </p:cTn>
+                              </p:par>
+                            </p:childTnLst>
+                          </p:cTn>
+                        </p:par>
+                      </p:childTnLst>
+                    </p:cTn>
+                  </p:par>
+                  <p:par>
+                    <p:cTn id="28" fill="hold">
+                      <p:stCondLst>
+                        <p:cond delay="indefinite"/>
+                      </p:stCondLst>
+                      <p:childTnLst>
+                        <p:par>
+                          <p:cTn id="29" fill="hold">
+                            <p:stCondLst>
+                              <p:cond delay="0"/>
+                            </p:stCondLst>
+                            <p:childTnLst>
+                              <p:par>
+                                <p:cTn id="30" presetID="10" presetClass="entr" presetSubtype="0" fill="hold" nodeType="clickEffect">
+                                  <p:stCondLst>
+                                    <p:cond delay="0"/>
+                                  </p:stCondLst>
+                                  <p:childTnLst>
+                                    <p:set>
+                                      <p:cBhvr>
+                                        <p:cTn id="31" dur="1" fill="hold">
+                                          <p:stCondLst>
+                                            <p:cond delay="0"/>
+                                          </p:stCondLst>
+                                        </p:cTn>
+                                        <p:tgtEl>
+                                          <p:spTgt spid="8"/>
+                                        </p:tgtEl>
+                                        <p:attrNameLst>
+                                          <p:attrName>style.visibility</p:attrName>
+                                        </p:attrNameLst>
+                                      </p:cBhvr>
+                                      <p:to>
+                                        <p:strVal val="visible"/>
+                                      </p:to>
+                                    </p:set>
+                                    <p:animEffect transition="in" filter="fade">
+                                      <p:cBhvr>
+                                        <p:cTn id="32" dur="2000"/>
+                                        <p:tgtEl>
+                                          <p:spTgt spid="8"/>
+                                        </p:tgtEl>
+                                      </p:cBhvr>
+                                    </p:animEffect>
+                                  </p:childTnLst>
+                                </p:cTn>
+                              </p:par>
+                            </p:childTnLst>
+                          </p:cTn>
+                        </p:par>
+                      </p:childTnLst>
+                    </p:cTn>
+                  </p:par>
+                </p:childTnLst>
+              </p:cTn>
+              <p:prevCondLst>
+                <p:cond evt="onPrev" delay="0">
+                  <p:tgtEl>
+                    <p:sldTgt/>
+                  </p:tgtEl>
+                </p:cond>
+              </p:prevCondLst>
+              <p:nextCondLst>
+                <p:cond evt="onNext" delay="0">
+                  <p:tgtEl>
+                    <p:sldTgt/>
+                  </p:tgtEl>
+                </p:cond>
+              </p:nextCondLst>
+            </p:seq>
+          </p:childTnLst>
+        </p:cTn>
+      </p:par>
+    </p:tnLst>
+  </p:timing>
 </p:sld>
 </file>
 

</xml_diff>